<commit_message>
updating lecture ch. 5
</commit_message>
<xml_diff>
--- a/STT465_5.pptx
+++ b/STT465_5.pptx
@@ -212,7 +212,7 @@
             <a:fld id="{EC2AD4C0-0FC1-44D9-A720-D776D6428221}" type="datetimeFigureOut">
               <a:rPr lang="en-US" smtClean="0"/>
               <a:pPr/>
-              <a:t>9/29/15</a:t>
+              <a:t>9/30/15</a:t>
             </a:fld>
             <a:endParaRPr lang="en-US"/>
           </a:p>
@@ -1813,7 +1813,7 @@
             <a:fld id="{F9C811E6-0209-4075-80E7-F5953C8ECEE3}" type="datetime1">
               <a:rPr lang="en-US" smtClean="0"/>
               <a:pPr/>
-              <a:t>9/29/15</a:t>
+              <a:t>9/30/15</a:t>
             </a:fld>
             <a:endParaRPr lang="en-US"/>
           </a:p>
@@ -1984,7 +1984,7 @@
             <a:fld id="{648E6BB1-E6D9-4EE7-828F-046F7223761D}" type="datetime1">
               <a:rPr lang="en-US" smtClean="0"/>
               <a:pPr/>
-              <a:t>9/29/15</a:t>
+              <a:t>9/30/15</a:t>
             </a:fld>
             <a:endParaRPr lang="en-US"/>
           </a:p>
@@ -2165,7 +2165,7 @@
             <a:fld id="{B4B9C580-A780-4D76-B2D1-C34F1DA97DF0}" type="datetime1">
               <a:rPr lang="en-US" smtClean="0"/>
               <a:pPr/>
-              <a:t>9/29/15</a:t>
+              <a:t>9/30/15</a:t>
             </a:fld>
             <a:endParaRPr lang="en-US"/>
           </a:p>
@@ -2336,7 +2336,7 @@
             <a:fld id="{EB19DDAF-3255-4785-974C-BB4FAF02D67E}" type="datetime1">
               <a:rPr lang="en-US" smtClean="0"/>
               <a:pPr/>
-              <a:t>9/29/15</a:t>
+              <a:t>9/30/15</a:t>
             </a:fld>
             <a:endParaRPr lang="en-US"/>
           </a:p>
@@ -2583,7 +2583,7 @@
             <a:fld id="{C344AF86-11D1-4E84-BA60-17130236FDAA}" type="datetime1">
               <a:rPr lang="en-US" smtClean="0"/>
               <a:pPr/>
-              <a:t>9/29/15</a:t>
+              <a:t>9/30/15</a:t>
             </a:fld>
             <a:endParaRPr lang="en-US"/>
           </a:p>
@@ -2872,7 +2872,7 @@
             <a:fld id="{A8DD670F-7E07-4783-A6F8-B28127B5AF4A}" type="datetime1">
               <a:rPr lang="en-US" smtClean="0"/>
               <a:pPr/>
-              <a:t>9/29/15</a:t>
+              <a:t>9/30/15</a:t>
             </a:fld>
             <a:endParaRPr lang="en-US"/>
           </a:p>
@@ -3295,7 +3295,7 @@
             <a:fld id="{92676DD9-688F-48EE-8233-B3B78BDDA63D}" type="datetime1">
               <a:rPr lang="en-US" smtClean="0"/>
               <a:pPr/>
-              <a:t>9/29/15</a:t>
+              <a:t>9/30/15</a:t>
             </a:fld>
             <a:endParaRPr lang="en-US"/>
           </a:p>
@@ -3414,7 +3414,7 @@
             <a:fld id="{F6CC4A83-AE34-48B8-B90E-70388FDBF0F7}" type="datetime1">
               <a:rPr lang="en-US" smtClean="0"/>
               <a:pPr/>
-              <a:t>9/29/15</a:t>
+              <a:t>9/30/15</a:t>
             </a:fld>
             <a:endParaRPr lang="en-US"/>
           </a:p>
@@ -3510,7 +3510,7 @@
             <a:fld id="{510CA3E2-9601-488E-B92B-23013819BD02}" type="datetime1">
               <a:rPr lang="en-US" smtClean="0"/>
               <a:pPr/>
-              <a:t>9/29/15</a:t>
+              <a:t>9/30/15</a:t>
             </a:fld>
             <a:endParaRPr lang="en-US"/>
           </a:p>
@@ -3788,7 +3788,7 @@
             <a:fld id="{331F1CBD-358A-4E18-86FD-C337233E15F0}" type="datetime1">
               <a:rPr lang="en-US" smtClean="0"/>
               <a:pPr/>
-              <a:t>9/29/15</a:t>
+              <a:t>9/30/15</a:t>
             </a:fld>
             <a:endParaRPr lang="en-US"/>
           </a:p>
@@ -4042,7 +4042,7 @@
             <a:fld id="{3CB4F0D5-901F-4458-A8F8-F062616694B4}" type="datetime1">
               <a:rPr lang="en-US" smtClean="0"/>
               <a:pPr/>
-              <a:t>9/29/15</a:t>
+              <a:t>9/30/15</a:t>
             </a:fld>
             <a:endParaRPr lang="en-US"/>
           </a:p>
@@ -4256,7 +4256,7 @@
             <a:fld id="{F77D84EF-BDBF-448B-906E-D51D4CAF22DC}" type="datetime1">
               <a:rPr lang="en-US" smtClean="0"/>
               <a:pPr/>
-              <a:t>9/29/15</a:t>
+              <a:t>9/30/15</a:t>
             </a:fld>
             <a:endParaRPr lang="en-US"/>
           </a:p>
@@ -4983,20 +4983,20 @@
           <p:nvPr>
             <p:extLst>
               <p:ext uri="{D42A27DB-BD31-4B8C-83A1-F6EECF244321}">
-                <p14:modId xmlns:p14="http://schemas.microsoft.com/office/powerpoint/2010/main" val="352334689"/>
+                <p14:modId xmlns:p14="http://schemas.microsoft.com/office/powerpoint/2010/main" val="207685360"/>
               </p:ext>
             </p:extLst>
           </p:nvPr>
         </p:nvGraphicFramePr>
         <p:xfrm>
-          <a:off x="2395538" y="1922463"/>
-          <a:ext cx="4875212" cy="1439862"/>
+          <a:off x="1447800" y="1905000"/>
+          <a:ext cx="5934108" cy="1752600"/>
         </p:xfrm>
         <a:graphic>
           <a:graphicData uri="http://schemas.openxmlformats.org/presentationml/2006/ole">
             <mc:AlternateContent xmlns:mc="http://schemas.openxmlformats.org/markup-compatibility/2006">
               <mc:Choice xmlns:v="urn:schemas-microsoft-com:vml" Requires="v">
-                <p:oleObj spid="_x0000_s8202" name="Equation" r:id="rId4" imgW="3657600" imgH="1079500" progId="Equation.3">
+                <p:oleObj spid="_x0000_s8205" name="Equation" r:id="rId4" imgW="3657600" imgH="1079500" progId="Equation.3">
                   <p:embed/>
                 </p:oleObj>
               </mc:Choice>
@@ -5017,8 +5017,8 @@
                     </p:blipFill>
                     <p:spPr>
                       <a:xfrm>
-                        <a:off x="2395538" y="1922463"/>
-                        <a:ext cx="4875212" cy="1439862"/>
+                        <a:off x="1447800" y="1905000"/>
+                        <a:ext cx="5934108" cy="1752600"/>
                       </a:xfrm>
                       <a:prstGeom prst="rect">
                         <a:avLst/>
@@ -5044,92 +5044,9 @@
   <p:timing>
     <p:tnLst>
       <p:par>
-        <p:cTn xmlns:p14="http://schemas.microsoft.com/office/powerpoint/2010/main" id="1" dur="indefinite" restart="never" nodeType="tmRoot">
-          <p:childTnLst>
-            <p:seq concurrent="1" nextAc="seek">
-              <p:cTn id="2" dur="indefinite" nodeType="mainSeq">
-                <p:childTnLst>
-                  <p:par>
-                    <p:cTn id="3" fill="hold">
-                      <p:stCondLst>
-                        <p:cond delay="indefinite"/>
-                      </p:stCondLst>
-                      <p:childTnLst>
-                        <p:par>
-                          <p:cTn id="4" fill="hold">
-                            <p:stCondLst>
-                              <p:cond delay="0"/>
-                            </p:stCondLst>
-                            <p:childTnLst>
-                              <p:par>
-                                <p:cTn id="5" presetID="3" presetClass="entr" presetSubtype="10" fill="hold" grpId="0" nodeType="clickEffect">
-                                  <p:stCondLst>
-                                    <p:cond delay="0"/>
-                                  </p:stCondLst>
-                                  <p:childTnLst>
-                                    <p:set>
-                                      <p:cBhvr>
-                                        <p:cTn id="6" dur="1" fill="hold">
-                                          <p:stCondLst>
-                                            <p:cond delay="0"/>
-                                          </p:stCondLst>
-                                        </p:cTn>
-                                        <p:tgtEl>
-                                          <p:spTgt spid="6">
-                                            <p:bg/>
-                                          </p:spTgt>
-                                        </p:tgtEl>
-                                        <p:attrNameLst>
-                                          <p:attrName>style.visibility</p:attrName>
-                                        </p:attrNameLst>
-                                      </p:cBhvr>
-                                      <p:to>
-                                        <p:strVal val="visible"/>
-                                      </p:to>
-                                    </p:set>
-                                    <p:animEffect transition="in" filter="blinds(horizontal)">
-                                      <p:cBhvr>
-                                        <p:cTn id="7" dur="500"/>
-                                        <p:tgtEl>
-                                          <p:spTgt spid="6">
-                                            <p:bg/>
-                                          </p:spTgt>
-                                        </p:tgtEl>
-                                      </p:cBhvr>
-                                    </p:animEffect>
-                                  </p:childTnLst>
-                                </p:cTn>
-                              </p:par>
-                            </p:childTnLst>
-                          </p:cTn>
-                        </p:par>
-                      </p:childTnLst>
-                    </p:cTn>
-                  </p:par>
-                </p:childTnLst>
-              </p:cTn>
-              <p:prevCondLst>
-                <p:cond evt="onPrev" delay="0">
-                  <p:tgtEl>
-                    <p:sldTgt/>
-                  </p:tgtEl>
-                </p:cond>
-              </p:prevCondLst>
-              <p:nextCondLst>
-                <p:cond evt="onNext" delay="0">
-                  <p:tgtEl>
-                    <p:sldTgt/>
-                  </p:tgtEl>
-                </p:cond>
-              </p:nextCondLst>
-            </p:seq>
-          </p:childTnLst>
-        </p:cTn>
+        <p:cTn xmlns:p14="http://schemas.microsoft.com/office/powerpoint/2010/main" id="1" dur="indefinite" restart="never" nodeType="tmRoot"/>
       </p:par>
     </p:tnLst>
-    <p:bldLst>
-      <p:bldP spid="6" grpId="0" build="p" bldLvl="2" animBg="1"/>
-    </p:bldLst>
   </p:timing>
 </p:sld>
 </file>
@@ -5506,7 +5423,7 @@
           <a:graphicData uri="http://schemas.openxmlformats.org/presentationml/2006/ole">
             <mc:AlternateContent xmlns:mc="http://schemas.openxmlformats.org/markup-compatibility/2006">
               <mc:Choice xmlns:v="urn:schemas-microsoft-com:vml" Requires="v">
-                <p:oleObj spid="_x0000_s9232" name="Equation" r:id="rId4" imgW="2717800" imgH="584200" progId="Equation.3">
+                <p:oleObj spid="_x0000_s9237" name="Equation" r:id="rId4" imgW="2717800" imgH="584200" progId="Equation.3">
                   <p:embed/>
                 </p:oleObj>
               </mc:Choice>
@@ -5563,7 +5480,7 @@
           <a:graphicData uri="http://schemas.openxmlformats.org/presentationml/2006/ole">
             <mc:AlternateContent xmlns:mc="http://schemas.openxmlformats.org/markup-compatibility/2006">
               <mc:Choice xmlns:v="urn:schemas-microsoft-com:vml" Requires="v">
-                <p:oleObj spid="_x0000_s9233" name="Equation" r:id="rId6" imgW="4635500" imgH="508000" progId="Equation.3">
+                <p:oleObj spid="_x0000_s9238" name="Equation" r:id="rId6" imgW="4635500" imgH="508000" progId="Equation.3">
                   <p:embed/>
                 </p:oleObj>
               </mc:Choice>
@@ -5611,92 +5528,9 @@
   <p:timing>
     <p:tnLst>
       <p:par>
-        <p:cTn xmlns:p14="http://schemas.microsoft.com/office/powerpoint/2010/main" id="1" dur="indefinite" restart="never" nodeType="tmRoot">
-          <p:childTnLst>
-            <p:seq concurrent="1" nextAc="seek">
-              <p:cTn id="2" dur="indefinite" nodeType="mainSeq">
-                <p:childTnLst>
-                  <p:par>
-                    <p:cTn id="3" fill="hold">
-                      <p:stCondLst>
-                        <p:cond delay="indefinite"/>
-                      </p:stCondLst>
-                      <p:childTnLst>
-                        <p:par>
-                          <p:cTn id="4" fill="hold">
-                            <p:stCondLst>
-                              <p:cond delay="0"/>
-                            </p:stCondLst>
-                            <p:childTnLst>
-                              <p:par>
-                                <p:cTn id="5" presetID="3" presetClass="entr" presetSubtype="10" fill="hold" grpId="0" nodeType="clickEffect">
-                                  <p:stCondLst>
-                                    <p:cond delay="0"/>
-                                  </p:stCondLst>
-                                  <p:childTnLst>
-                                    <p:set>
-                                      <p:cBhvr>
-                                        <p:cTn id="6" dur="1" fill="hold">
-                                          <p:stCondLst>
-                                            <p:cond delay="0"/>
-                                          </p:stCondLst>
-                                        </p:cTn>
-                                        <p:tgtEl>
-                                          <p:spTgt spid="6">
-                                            <p:bg/>
-                                          </p:spTgt>
-                                        </p:tgtEl>
-                                        <p:attrNameLst>
-                                          <p:attrName>style.visibility</p:attrName>
-                                        </p:attrNameLst>
-                                      </p:cBhvr>
-                                      <p:to>
-                                        <p:strVal val="visible"/>
-                                      </p:to>
-                                    </p:set>
-                                    <p:animEffect transition="in" filter="blinds(horizontal)">
-                                      <p:cBhvr>
-                                        <p:cTn id="7" dur="500"/>
-                                        <p:tgtEl>
-                                          <p:spTgt spid="6">
-                                            <p:bg/>
-                                          </p:spTgt>
-                                        </p:tgtEl>
-                                      </p:cBhvr>
-                                    </p:animEffect>
-                                  </p:childTnLst>
-                                </p:cTn>
-                              </p:par>
-                            </p:childTnLst>
-                          </p:cTn>
-                        </p:par>
-                      </p:childTnLst>
-                    </p:cTn>
-                  </p:par>
-                </p:childTnLst>
-              </p:cTn>
-              <p:prevCondLst>
-                <p:cond evt="onPrev" delay="0">
-                  <p:tgtEl>
-                    <p:sldTgt/>
-                  </p:tgtEl>
-                </p:cond>
-              </p:prevCondLst>
-              <p:nextCondLst>
-                <p:cond evt="onNext" delay="0">
-                  <p:tgtEl>
-                    <p:sldTgt/>
-                  </p:tgtEl>
-                </p:cond>
-              </p:nextCondLst>
-            </p:seq>
-          </p:childTnLst>
-        </p:cTn>
+        <p:cTn xmlns:p14="http://schemas.microsoft.com/office/powerpoint/2010/main" id="1" dur="indefinite" restart="never" nodeType="tmRoot"/>
       </p:par>
     </p:tnLst>
-    <p:bldLst>
-      <p:bldP spid="6" grpId="0" build="p" bldLvl="2" animBg="1"/>
-    </p:bldLst>
   </p:timing>
 </p:sld>
 </file>
@@ -6201,7 +6035,27 @@
                   </a:schemeClr>
                 </a:solidFill>
               </a:rPr>
-              <a:t>	- Sample on unknown from its marginal posterior distribution</a:t>
+              <a:t>	- Sample </a:t>
+            </a:r>
+            <a:r>
+              <a:rPr lang="en-US" dirty="0" smtClean="0">
+                <a:solidFill>
+                  <a:schemeClr val="accent1">
+                    <a:lumMod val="75000"/>
+                  </a:schemeClr>
+                </a:solidFill>
+              </a:rPr>
+              <a:t>one </a:t>
+            </a:r>
+            <a:r>
+              <a:rPr lang="en-US" dirty="0" smtClean="0">
+                <a:solidFill>
+                  <a:schemeClr val="accent1">
+                    <a:lumMod val="75000"/>
+                  </a:schemeClr>
+                </a:solidFill>
+              </a:rPr>
+              <a:t>unknown from its marginal posterior distribution</a:t>
             </a:r>
           </a:p>
           <a:p>
@@ -6258,25 +6112,25 @@
           <p:nvPr>
             <p:extLst>
               <p:ext uri="{D42A27DB-BD31-4B8C-83A1-F6EECF244321}">
-                <p14:modId xmlns:p14="http://schemas.microsoft.com/office/powerpoint/2010/main" val="4291724090"/>
+                <p14:modId xmlns:p14="http://schemas.microsoft.com/office/powerpoint/2010/main" val="2332598682"/>
               </p:ext>
             </p:extLst>
           </p:nvPr>
         </p:nvGraphicFramePr>
         <p:xfrm>
-          <a:off x="1600200" y="2971800"/>
-          <a:ext cx="3289300" cy="292100"/>
+          <a:off x="1673225" y="2895600"/>
+          <a:ext cx="5108575" cy="457200"/>
         </p:xfrm>
         <a:graphic>
           <a:graphicData uri="http://schemas.openxmlformats.org/presentationml/2006/ole">
             <mc:AlternateContent xmlns:mc="http://schemas.openxmlformats.org/markup-compatibility/2006">
               <mc:Choice xmlns:v="urn:schemas-microsoft-com:vml" Requires="v">
-                <p:oleObj spid="_x0000_s10256" name="Equation" r:id="rId4" imgW="3289300" imgH="292100" progId="Equation.3">
+                <p:oleObj spid="_x0000_s10261" name="Equation" r:id="rId4" imgW="3263900" imgH="292100" progId="Equation.3">
                   <p:embed/>
                 </p:oleObj>
               </mc:Choice>
               <mc:Fallback>
-                <p:oleObj name="Equation" r:id="rId4" imgW="3289300" imgH="292100" progId="Equation.3">
+                <p:oleObj name="Equation" r:id="rId4" imgW="3263900" imgH="292100" progId="Equation.3">
                   <p:embed/>
                   <p:pic>
                     <p:nvPicPr>
@@ -6292,8 +6146,8 @@
                     </p:blipFill>
                     <p:spPr>
                       <a:xfrm>
-                        <a:off x="1600200" y="2971800"/>
-                        <a:ext cx="3289300" cy="292100"/>
+                        <a:off x="1673225" y="2895600"/>
+                        <a:ext cx="5108575" cy="457200"/>
                       </a:xfrm>
                       <a:prstGeom prst="rect">
                         <a:avLst/>
@@ -6315,25 +6169,25 @@
           <p:nvPr>
             <p:extLst>
               <p:ext uri="{D42A27DB-BD31-4B8C-83A1-F6EECF244321}">
-                <p14:modId xmlns:p14="http://schemas.microsoft.com/office/powerpoint/2010/main" val="2441672993"/>
+                <p14:modId xmlns:p14="http://schemas.microsoft.com/office/powerpoint/2010/main" val="4224870185"/>
               </p:ext>
             </p:extLst>
           </p:nvPr>
         </p:nvGraphicFramePr>
         <p:xfrm>
-          <a:off x="1638300" y="3657600"/>
-          <a:ext cx="3213100" cy="292100"/>
+          <a:off x="1657350" y="3657600"/>
+          <a:ext cx="4989513" cy="457200"/>
         </p:xfrm>
         <a:graphic>
           <a:graphicData uri="http://schemas.openxmlformats.org/presentationml/2006/ole">
             <mc:AlternateContent xmlns:mc="http://schemas.openxmlformats.org/markup-compatibility/2006">
               <mc:Choice xmlns:v="urn:schemas-microsoft-com:vml" Requires="v">
-                <p:oleObj spid="_x0000_s10257" name="Equation" r:id="rId6" imgW="3213100" imgH="292100" progId="Equation.3">
+                <p:oleObj spid="_x0000_s10262" name="Equation" r:id="rId6" imgW="3187700" imgH="292100" progId="Equation.3">
                   <p:embed/>
                 </p:oleObj>
               </mc:Choice>
               <mc:Fallback>
-                <p:oleObj name="Equation" r:id="rId6" imgW="3213100" imgH="292100" progId="Equation.3">
+                <p:oleObj name="Equation" r:id="rId6" imgW="3187700" imgH="292100" progId="Equation.3">
                   <p:embed/>
                   <p:pic>
                     <p:nvPicPr>
@@ -6349,8 +6203,8 @@
                     </p:blipFill>
                     <p:spPr>
                       <a:xfrm>
-                        <a:off x="1638300" y="3657600"/>
-                        <a:ext cx="3213100" cy="292100"/>
+                        <a:off x="1657350" y="3657600"/>
+                        <a:ext cx="4989513" cy="457200"/>
                       </a:xfrm>
                       <a:prstGeom prst="rect">
                         <a:avLst/>
@@ -6376,92 +6230,9 @@
   <p:timing>
     <p:tnLst>
       <p:par>
-        <p:cTn xmlns:p14="http://schemas.microsoft.com/office/powerpoint/2010/main" id="1" dur="indefinite" restart="never" nodeType="tmRoot">
-          <p:childTnLst>
-            <p:seq concurrent="1" nextAc="seek">
-              <p:cTn id="2" dur="indefinite" nodeType="mainSeq">
-                <p:childTnLst>
-                  <p:par>
-                    <p:cTn id="3" fill="hold">
-                      <p:stCondLst>
-                        <p:cond delay="indefinite"/>
-                      </p:stCondLst>
-                      <p:childTnLst>
-                        <p:par>
-                          <p:cTn id="4" fill="hold">
-                            <p:stCondLst>
-                              <p:cond delay="0"/>
-                            </p:stCondLst>
-                            <p:childTnLst>
-                              <p:par>
-                                <p:cTn id="5" presetID="3" presetClass="entr" presetSubtype="10" fill="hold" grpId="0" nodeType="clickEffect">
-                                  <p:stCondLst>
-                                    <p:cond delay="0"/>
-                                  </p:stCondLst>
-                                  <p:childTnLst>
-                                    <p:set>
-                                      <p:cBhvr>
-                                        <p:cTn id="6" dur="1" fill="hold">
-                                          <p:stCondLst>
-                                            <p:cond delay="0"/>
-                                          </p:stCondLst>
-                                        </p:cTn>
-                                        <p:tgtEl>
-                                          <p:spTgt spid="6">
-                                            <p:bg/>
-                                          </p:spTgt>
-                                        </p:tgtEl>
-                                        <p:attrNameLst>
-                                          <p:attrName>style.visibility</p:attrName>
-                                        </p:attrNameLst>
-                                      </p:cBhvr>
-                                      <p:to>
-                                        <p:strVal val="visible"/>
-                                      </p:to>
-                                    </p:set>
-                                    <p:animEffect transition="in" filter="blinds(horizontal)">
-                                      <p:cBhvr>
-                                        <p:cTn id="7" dur="500"/>
-                                        <p:tgtEl>
-                                          <p:spTgt spid="6">
-                                            <p:bg/>
-                                          </p:spTgt>
-                                        </p:tgtEl>
-                                      </p:cBhvr>
-                                    </p:animEffect>
-                                  </p:childTnLst>
-                                </p:cTn>
-                              </p:par>
-                            </p:childTnLst>
-                          </p:cTn>
-                        </p:par>
-                      </p:childTnLst>
-                    </p:cTn>
-                  </p:par>
-                </p:childTnLst>
-              </p:cTn>
-              <p:prevCondLst>
-                <p:cond evt="onPrev" delay="0">
-                  <p:tgtEl>
-                    <p:sldTgt/>
-                  </p:tgtEl>
-                </p:cond>
-              </p:prevCondLst>
-              <p:nextCondLst>
-                <p:cond evt="onNext" delay="0">
-                  <p:tgtEl>
-                    <p:sldTgt/>
-                  </p:tgtEl>
-                </p:cond>
-              </p:nextCondLst>
-            </p:seq>
-          </p:childTnLst>
-        </p:cTn>
+        <p:cTn xmlns:p14="http://schemas.microsoft.com/office/powerpoint/2010/main" id="1" dur="indefinite" restart="never" nodeType="tmRoot"/>
       </p:par>
     </p:tnLst>
-    <p:bldLst>
-      <p:bldP spid="6" grpId="0" build="p" bldLvl="2" animBg="1"/>
-    </p:bldLst>
   </p:timing>
 </p:sld>
 </file>
@@ -6860,20 +6631,20 @@
           <p:nvPr>
             <p:extLst>
               <p:ext uri="{D42A27DB-BD31-4B8C-83A1-F6EECF244321}">
-                <p14:modId xmlns:p14="http://schemas.microsoft.com/office/powerpoint/2010/main" val="643436745"/>
+                <p14:modId xmlns:p14="http://schemas.microsoft.com/office/powerpoint/2010/main" val="1618685714"/>
               </p:ext>
             </p:extLst>
           </p:nvPr>
         </p:nvGraphicFramePr>
         <p:xfrm>
-          <a:off x="1828800" y="1752600"/>
-          <a:ext cx="5321576" cy="476250"/>
+          <a:off x="1570383" y="1828800"/>
+          <a:ext cx="6811617" cy="609600"/>
         </p:xfrm>
         <a:graphic>
           <a:graphicData uri="http://schemas.openxmlformats.org/presentationml/2006/ole">
             <mc:AlternateContent xmlns:mc="http://schemas.openxmlformats.org/markup-compatibility/2006">
               <mc:Choice xmlns:v="urn:schemas-microsoft-com:vml" Requires="v">
-                <p:oleObj spid="_x0000_s11300" name="Equation" r:id="rId4" imgW="3263900" imgH="292100" progId="Equation.3">
+                <p:oleObj spid="_x0000_s11311" name="Equation" r:id="rId4" imgW="3263900" imgH="292100" progId="Equation.3">
                   <p:embed/>
                 </p:oleObj>
               </mc:Choice>
@@ -6894,8 +6665,8 @@
                     </p:blipFill>
                     <p:spPr>
                       <a:xfrm>
-                        <a:off x="1828800" y="1752600"/>
-                        <a:ext cx="5321576" cy="476250"/>
+                        <a:off x="1570383" y="1828800"/>
+                        <a:ext cx="6811617" cy="609600"/>
                       </a:xfrm>
                       <a:prstGeom prst="rect">
                         <a:avLst/>
@@ -6917,20 +6688,20 @@
           <p:nvPr>
             <p:extLst>
               <p:ext uri="{D42A27DB-BD31-4B8C-83A1-F6EECF244321}">
-                <p14:modId xmlns:p14="http://schemas.microsoft.com/office/powerpoint/2010/main" val="1954908477"/>
+                <p14:modId xmlns:p14="http://schemas.microsoft.com/office/powerpoint/2010/main" val="2901417480"/>
               </p:ext>
             </p:extLst>
           </p:nvPr>
         </p:nvGraphicFramePr>
         <p:xfrm>
-          <a:off x="1524000" y="3048000"/>
-          <a:ext cx="5072062" cy="1392237"/>
+          <a:off x="1523999" y="2895600"/>
+          <a:ext cx="5829693" cy="1600200"/>
         </p:xfrm>
         <a:graphic>
           <a:graphicData uri="http://schemas.openxmlformats.org/presentationml/2006/ole">
             <mc:AlternateContent xmlns:mc="http://schemas.openxmlformats.org/markup-compatibility/2006">
               <mc:Choice xmlns:v="urn:schemas-microsoft-com:vml" Requires="v">
-                <p:oleObj spid="_x0000_s11301" name="Equation" r:id="rId6" imgW="3238500" imgH="889000" progId="Equation.3">
+                <p:oleObj spid="_x0000_s11312" name="Equation" r:id="rId6" imgW="3238500" imgH="889000" progId="Equation.3">
                   <p:embed/>
                 </p:oleObj>
               </mc:Choice>
@@ -6951,8 +6722,8 @@
                     </p:blipFill>
                     <p:spPr>
                       <a:xfrm>
-                        <a:off x="1524000" y="3048000"/>
-                        <a:ext cx="5072062" cy="1392237"/>
+                        <a:off x="1523999" y="2895600"/>
+                        <a:ext cx="5829693" cy="1600200"/>
                       </a:xfrm>
                       <a:prstGeom prst="rect">
                         <a:avLst/>
@@ -6974,20 +6745,20 @@
           <p:nvPr>
             <p:extLst>
               <p:ext uri="{D42A27DB-BD31-4B8C-83A1-F6EECF244321}">
-                <p14:modId xmlns:p14="http://schemas.microsoft.com/office/powerpoint/2010/main" val="2268384135"/>
+                <p14:modId xmlns:p14="http://schemas.microsoft.com/office/powerpoint/2010/main" val="4078641141"/>
               </p:ext>
             </p:extLst>
           </p:nvPr>
         </p:nvGraphicFramePr>
         <p:xfrm>
-          <a:off x="4114800" y="4800600"/>
-          <a:ext cx="1016000" cy="457200"/>
+          <a:off x="4114799" y="4800600"/>
+          <a:ext cx="1185333" cy="533400"/>
         </p:xfrm>
         <a:graphic>
           <a:graphicData uri="http://schemas.openxmlformats.org/presentationml/2006/ole">
             <mc:AlternateContent xmlns:mc="http://schemas.openxmlformats.org/markup-compatibility/2006">
               <mc:Choice xmlns:v="urn:schemas-microsoft-com:vml" Requires="v">
-                <p:oleObj spid="_x0000_s11302" name="Equation" r:id="rId8" imgW="508000" imgH="228600" progId="Equation.3">
+                <p:oleObj spid="_x0000_s11313" name="Equation" r:id="rId8" imgW="508000" imgH="228600" progId="Equation.3">
                   <p:embed/>
                 </p:oleObj>
               </mc:Choice>
@@ -7008,8 +6779,8 @@
                     </p:blipFill>
                     <p:spPr>
                       <a:xfrm>
-                        <a:off x="4114800" y="4800600"/>
-                        <a:ext cx="1016000" cy="457200"/>
+                        <a:off x="4114799" y="4800600"/>
+                        <a:ext cx="1185333" cy="533400"/>
                       </a:xfrm>
                       <a:prstGeom prst="rect">
                         <a:avLst/>
@@ -7031,25 +6802,25 @@
           <p:nvPr>
             <p:extLst>
               <p:ext uri="{D42A27DB-BD31-4B8C-83A1-F6EECF244321}">
-                <p14:modId xmlns:p14="http://schemas.microsoft.com/office/powerpoint/2010/main" val="4191819660"/>
+                <p14:modId xmlns:p14="http://schemas.microsoft.com/office/powerpoint/2010/main" val="4110409141"/>
               </p:ext>
             </p:extLst>
           </p:nvPr>
         </p:nvGraphicFramePr>
         <p:xfrm>
-          <a:off x="2252663" y="5410200"/>
-          <a:ext cx="3330575" cy="381000"/>
+          <a:off x="2292350" y="5410200"/>
+          <a:ext cx="3917950" cy="457200"/>
         </p:xfrm>
         <a:graphic>
           <a:graphicData uri="http://schemas.openxmlformats.org/presentationml/2006/ole">
             <mc:AlternateContent xmlns:mc="http://schemas.openxmlformats.org/markup-compatibility/2006">
               <mc:Choice xmlns:v="urn:schemas-microsoft-com:vml" Requires="v">
-                <p:oleObj spid="_x0000_s11303" name="Equation" r:id="rId10" imgW="2552700" imgH="292100" progId="Equation.3">
+                <p:oleObj spid="_x0000_s11314" name="Equation" r:id="rId10" imgW="2501900" imgH="292100" progId="Equation.3">
                   <p:embed/>
                 </p:oleObj>
               </mc:Choice>
               <mc:Fallback>
-                <p:oleObj name="Equation" r:id="rId10" imgW="2552700" imgH="292100" progId="Equation.3">
+                <p:oleObj name="Equation" r:id="rId10" imgW="2501900" imgH="292100" progId="Equation.3">
                   <p:embed/>
                   <p:pic>
                     <p:nvPicPr>
@@ -7065,8 +6836,8 @@
                     </p:blipFill>
                     <p:spPr>
                       <a:xfrm>
-                        <a:off x="2252663" y="5410200"/>
-                        <a:ext cx="3330575" cy="381000"/>
+                        <a:off x="2292350" y="5410200"/>
+                        <a:ext cx="3917950" cy="457200"/>
                       </a:xfrm>
                       <a:prstGeom prst="rect">
                         <a:avLst/>
@@ -7088,25 +6859,25 @@
           <p:nvPr>
             <p:extLst>
               <p:ext uri="{D42A27DB-BD31-4B8C-83A1-F6EECF244321}">
-                <p14:modId xmlns:p14="http://schemas.microsoft.com/office/powerpoint/2010/main" val="3501133850"/>
+                <p14:modId xmlns:p14="http://schemas.microsoft.com/office/powerpoint/2010/main" val="1105594989"/>
               </p:ext>
             </p:extLst>
           </p:nvPr>
         </p:nvGraphicFramePr>
         <p:xfrm>
-          <a:off x="1368424" y="5791200"/>
-          <a:ext cx="7165976" cy="668338"/>
+          <a:off x="1219200" y="5884862"/>
+          <a:ext cx="7086600" cy="668338"/>
         </p:xfrm>
         <a:graphic>
           <a:graphicData uri="http://schemas.openxmlformats.org/presentationml/2006/ole">
             <mc:AlternateContent xmlns:mc="http://schemas.openxmlformats.org/markup-compatibility/2006">
               <mc:Choice xmlns:v="urn:schemas-microsoft-com:vml" Requires="v">
-                <p:oleObj spid="_x0000_s11304" name="Equation" r:id="rId12" imgW="4635500" imgH="431800" progId="Equation.3">
+                <p:oleObj spid="_x0000_s11315" name="Equation" r:id="rId12" imgW="4584700" imgH="431800" progId="Equation.3">
                   <p:embed/>
                 </p:oleObj>
               </mc:Choice>
               <mc:Fallback>
-                <p:oleObj name="Equation" r:id="rId12" imgW="4635500" imgH="431800" progId="Equation.3">
+                <p:oleObj name="Equation" r:id="rId12" imgW="4584700" imgH="431800" progId="Equation.3">
                   <p:embed/>
                   <p:pic>
                     <p:nvPicPr>
@@ -7122,8 +6893,8 @@
                     </p:blipFill>
                     <p:spPr>
                       <a:xfrm>
-                        <a:off x="1368424" y="5791200"/>
-                        <a:ext cx="7165976" cy="668338"/>
+                        <a:off x="1219200" y="5884862"/>
+                        <a:ext cx="7086600" cy="668338"/>
                       </a:xfrm>
                       <a:prstGeom prst="rect">
                         <a:avLst/>
@@ -7777,7 +7548,19 @@
                   </a:schemeClr>
                 </a:solidFill>
               </a:rPr>
-              <a:t>       The above algorithm </a:t>
+              <a:t>       The above algorithm renders samples from the joint posterior </a:t>
+            </a:r>
+          </a:p>
+          <a:p>
+            <a:r>
+              <a:rPr lang="en-US" dirty="0">
+                <a:solidFill>
+                  <a:schemeClr val="accent1">
+                    <a:lumMod val="75000"/>
+                  </a:schemeClr>
+                </a:solidFill>
+              </a:rPr>
+              <a:t> </a:t>
             </a:r>
             <a:r>
               <a:rPr lang="en-US" dirty="0" smtClean="0">
@@ -7787,49 +7570,7 @@
                   </a:schemeClr>
                 </a:solidFill>
               </a:rPr>
-              <a:t>renders </a:t>
-            </a:r>
-            <a:r>
-              <a:rPr lang="en-US" dirty="0" smtClean="0">
-                <a:solidFill>
-                  <a:schemeClr val="accent1">
-                    <a:lumMod val="75000"/>
-                  </a:schemeClr>
-                </a:solidFill>
-              </a:rPr>
-              <a:t>samples from the joint posterior </a:t>
-            </a:r>
-          </a:p>
-          <a:p>
-            <a:r>
-              <a:rPr lang="en-US" dirty="0">
-                <a:solidFill>
-                  <a:schemeClr val="accent1">
-                    <a:lumMod val="75000"/>
-                  </a:schemeClr>
-                </a:solidFill>
-              </a:rPr>
-              <a:t> </a:t>
-            </a:r>
-            <a:r>
-              <a:rPr lang="en-US" dirty="0" smtClean="0">
-                <a:solidFill>
-                  <a:schemeClr val="accent1">
-                    <a:lumMod val="75000"/>
-                  </a:schemeClr>
-                </a:solidFill>
-              </a:rPr>
-              <a:t>       (note these are not IID</a:t>
-            </a:r>
-            <a:r>
-              <a:rPr lang="en-US" dirty="0" smtClean="0">
-                <a:solidFill>
-                  <a:schemeClr val="accent1">
-                    <a:lumMod val="75000"/>
-                  </a:schemeClr>
-                </a:solidFill>
-              </a:rPr>
-              <a:t>)</a:t>
+              <a:t>       (note these are not IID)</a:t>
             </a:r>
             <a:endParaRPr lang="en-US" dirty="0">
               <a:solidFill>
@@ -8327,641 +8068,9 @@
   <p:timing>
     <p:tnLst>
       <p:par>
-        <p:cTn xmlns:p14="http://schemas.microsoft.com/office/powerpoint/2010/main" id="1" dur="indefinite" restart="never" nodeType="tmRoot">
-          <p:childTnLst>
-            <p:seq concurrent="1" nextAc="seek">
-              <p:cTn id="2" dur="indefinite" nodeType="mainSeq">
-                <p:childTnLst>
-                  <p:par>
-                    <p:cTn id="3" fill="hold">
-                      <p:stCondLst>
-                        <p:cond delay="indefinite"/>
-                      </p:stCondLst>
-                      <p:childTnLst>
-                        <p:par>
-                          <p:cTn id="4" fill="hold">
-                            <p:stCondLst>
-                              <p:cond delay="0"/>
-                            </p:stCondLst>
-                            <p:childTnLst>
-                              <p:par>
-                                <p:cTn id="5" presetID="3" presetClass="entr" presetSubtype="10" fill="hold" grpId="0" nodeType="clickEffect">
-                                  <p:stCondLst>
-                                    <p:cond delay="0"/>
-                                  </p:stCondLst>
-                                  <p:childTnLst>
-                                    <p:set>
-                                      <p:cBhvr>
-                                        <p:cTn id="6" dur="1" fill="hold">
-                                          <p:stCondLst>
-                                            <p:cond delay="0"/>
-                                          </p:stCondLst>
-                                        </p:cTn>
-                                        <p:tgtEl>
-                                          <p:spTgt spid="6">
-                                            <p:bg/>
-                                          </p:spTgt>
-                                        </p:tgtEl>
-                                        <p:attrNameLst>
-                                          <p:attrName>style.visibility</p:attrName>
-                                        </p:attrNameLst>
-                                      </p:cBhvr>
-                                      <p:to>
-                                        <p:strVal val="visible"/>
-                                      </p:to>
-                                    </p:set>
-                                    <p:animEffect transition="in" filter="blinds(horizontal)">
-                                      <p:cBhvr>
-                                        <p:cTn id="7" dur="500"/>
-                                        <p:tgtEl>
-                                          <p:spTgt spid="6">
-                                            <p:bg/>
-                                          </p:spTgt>
-                                        </p:tgtEl>
-                                      </p:cBhvr>
-                                    </p:animEffect>
-                                  </p:childTnLst>
-                                </p:cTn>
-                              </p:par>
-                            </p:childTnLst>
-                          </p:cTn>
-                        </p:par>
-                      </p:childTnLst>
-                    </p:cTn>
-                  </p:par>
-                  <p:par>
-                    <p:cTn id="8" fill="hold">
-                      <p:stCondLst>
-                        <p:cond delay="indefinite"/>
-                      </p:stCondLst>
-                      <p:childTnLst>
-                        <p:par>
-                          <p:cTn id="9" fill="hold">
-                            <p:stCondLst>
-                              <p:cond delay="0"/>
-                            </p:stCondLst>
-                            <p:childTnLst>
-                              <p:par>
-                                <p:cTn id="10" presetID="3" presetClass="entr" presetSubtype="10" fill="hold" grpId="0" nodeType="clickEffect">
-                                  <p:stCondLst>
-                                    <p:cond delay="0"/>
-                                  </p:stCondLst>
-                                  <p:childTnLst>
-                                    <p:set>
-                                      <p:cBhvr>
-                                        <p:cTn id="11" dur="1" fill="hold">
-                                          <p:stCondLst>
-                                            <p:cond delay="0"/>
-                                          </p:stCondLst>
-                                        </p:cTn>
-                                        <p:tgtEl>
-                                          <p:spTgt spid="6">
-                                            <p:txEl>
-                                              <p:pRg st="1" end="1"/>
-                                            </p:txEl>
-                                          </p:spTgt>
-                                        </p:tgtEl>
-                                        <p:attrNameLst>
-                                          <p:attrName>style.visibility</p:attrName>
-                                        </p:attrNameLst>
-                                      </p:cBhvr>
-                                      <p:to>
-                                        <p:strVal val="visible"/>
-                                      </p:to>
-                                    </p:set>
-                                    <p:animEffect transition="in" filter="blinds(horizontal)">
-                                      <p:cBhvr>
-                                        <p:cTn id="12" dur="500"/>
-                                        <p:tgtEl>
-                                          <p:spTgt spid="6">
-                                            <p:txEl>
-                                              <p:pRg st="1" end="1"/>
-                                            </p:txEl>
-                                          </p:spTgt>
-                                        </p:tgtEl>
-                                      </p:cBhvr>
-                                    </p:animEffect>
-                                  </p:childTnLst>
-                                </p:cTn>
-                              </p:par>
-                            </p:childTnLst>
-                          </p:cTn>
-                        </p:par>
-                      </p:childTnLst>
-                    </p:cTn>
-                  </p:par>
-                  <p:par>
-                    <p:cTn id="13" fill="hold">
-                      <p:stCondLst>
-                        <p:cond delay="indefinite"/>
-                      </p:stCondLst>
-                      <p:childTnLst>
-                        <p:par>
-                          <p:cTn id="14" fill="hold">
-                            <p:stCondLst>
-                              <p:cond delay="0"/>
-                            </p:stCondLst>
-                            <p:childTnLst>
-                              <p:par>
-                                <p:cTn id="15" presetID="3" presetClass="entr" presetSubtype="10" fill="hold" grpId="0" nodeType="clickEffect">
-                                  <p:stCondLst>
-                                    <p:cond delay="0"/>
-                                  </p:stCondLst>
-                                  <p:childTnLst>
-                                    <p:set>
-                                      <p:cBhvr>
-                                        <p:cTn id="16" dur="1" fill="hold">
-                                          <p:stCondLst>
-                                            <p:cond delay="0"/>
-                                          </p:stCondLst>
-                                        </p:cTn>
-                                        <p:tgtEl>
-                                          <p:spTgt spid="6">
-                                            <p:txEl>
-                                              <p:pRg st="3" end="3"/>
-                                            </p:txEl>
-                                          </p:spTgt>
-                                        </p:tgtEl>
-                                        <p:attrNameLst>
-                                          <p:attrName>style.visibility</p:attrName>
-                                        </p:attrNameLst>
-                                      </p:cBhvr>
-                                      <p:to>
-                                        <p:strVal val="visible"/>
-                                      </p:to>
-                                    </p:set>
-                                    <p:animEffect transition="in" filter="blinds(horizontal)">
-                                      <p:cBhvr>
-                                        <p:cTn id="17" dur="500"/>
-                                        <p:tgtEl>
-                                          <p:spTgt spid="6">
-                                            <p:txEl>
-                                              <p:pRg st="3" end="3"/>
-                                            </p:txEl>
-                                          </p:spTgt>
-                                        </p:tgtEl>
-                                      </p:cBhvr>
-                                    </p:animEffect>
-                                  </p:childTnLst>
-                                </p:cTn>
-                              </p:par>
-                            </p:childTnLst>
-                          </p:cTn>
-                        </p:par>
-                      </p:childTnLst>
-                    </p:cTn>
-                  </p:par>
-                  <p:par>
-                    <p:cTn id="18" fill="hold">
-                      <p:stCondLst>
-                        <p:cond delay="indefinite"/>
-                      </p:stCondLst>
-                      <p:childTnLst>
-                        <p:par>
-                          <p:cTn id="19" fill="hold">
-                            <p:stCondLst>
-                              <p:cond delay="0"/>
-                            </p:stCondLst>
-                            <p:childTnLst>
-                              <p:par>
-                                <p:cTn id="20" presetID="3" presetClass="entr" presetSubtype="10" fill="hold" grpId="0" nodeType="clickEffect">
-                                  <p:stCondLst>
-                                    <p:cond delay="0"/>
-                                  </p:stCondLst>
-                                  <p:childTnLst>
-                                    <p:set>
-                                      <p:cBhvr>
-                                        <p:cTn id="21" dur="1" fill="hold">
-                                          <p:stCondLst>
-                                            <p:cond delay="0"/>
-                                          </p:stCondLst>
-                                        </p:cTn>
-                                        <p:tgtEl>
-                                          <p:spTgt spid="6">
-                                            <p:txEl>
-                                              <p:pRg st="5" end="5"/>
-                                            </p:txEl>
-                                          </p:spTgt>
-                                        </p:tgtEl>
-                                        <p:attrNameLst>
-                                          <p:attrName>style.visibility</p:attrName>
-                                        </p:attrNameLst>
-                                      </p:cBhvr>
-                                      <p:to>
-                                        <p:strVal val="visible"/>
-                                      </p:to>
-                                    </p:set>
-                                    <p:animEffect transition="in" filter="blinds(horizontal)">
-                                      <p:cBhvr>
-                                        <p:cTn id="22" dur="500"/>
-                                        <p:tgtEl>
-                                          <p:spTgt spid="6">
-                                            <p:txEl>
-                                              <p:pRg st="5" end="5"/>
-                                            </p:txEl>
-                                          </p:spTgt>
-                                        </p:tgtEl>
-                                      </p:cBhvr>
-                                    </p:animEffect>
-                                  </p:childTnLst>
-                                </p:cTn>
-                              </p:par>
-                            </p:childTnLst>
-                          </p:cTn>
-                        </p:par>
-                      </p:childTnLst>
-                    </p:cTn>
-                  </p:par>
-                  <p:par>
-                    <p:cTn id="23" fill="hold">
-                      <p:stCondLst>
-                        <p:cond delay="indefinite"/>
-                      </p:stCondLst>
-                      <p:childTnLst>
-                        <p:par>
-                          <p:cTn id="24" fill="hold">
-                            <p:stCondLst>
-                              <p:cond delay="0"/>
-                            </p:stCondLst>
-                            <p:childTnLst>
-                              <p:par>
-                                <p:cTn id="25" presetID="3" presetClass="entr" presetSubtype="10" fill="hold" grpId="0" nodeType="clickEffect">
-                                  <p:stCondLst>
-                                    <p:cond delay="0"/>
-                                  </p:stCondLst>
-                                  <p:childTnLst>
-                                    <p:set>
-                                      <p:cBhvr>
-                                        <p:cTn id="26" dur="1" fill="hold">
-                                          <p:stCondLst>
-                                            <p:cond delay="0"/>
-                                          </p:stCondLst>
-                                        </p:cTn>
-                                        <p:tgtEl>
-                                          <p:spTgt spid="6">
-                                            <p:txEl>
-                                              <p:pRg st="7" end="7"/>
-                                            </p:txEl>
-                                          </p:spTgt>
-                                        </p:tgtEl>
-                                        <p:attrNameLst>
-                                          <p:attrName>style.visibility</p:attrName>
-                                        </p:attrNameLst>
-                                      </p:cBhvr>
-                                      <p:to>
-                                        <p:strVal val="visible"/>
-                                      </p:to>
-                                    </p:set>
-                                    <p:animEffect transition="in" filter="blinds(horizontal)">
-                                      <p:cBhvr>
-                                        <p:cTn id="27" dur="500"/>
-                                        <p:tgtEl>
-                                          <p:spTgt spid="6">
-                                            <p:txEl>
-                                              <p:pRg st="7" end="7"/>
-                                            </p:txEl>
-                                          </p:spTgt>
-                                        </p:tgtEl>
-                                      </p:cBhvr>
-                                    </p:animEffect>
-                                  </p:childTnLst>
-                                </p:cTn>
-                              </p:par>
-                            </p:childTnLst>
-                          </p:cTn>
-                        </p:par>
-                      </p:childTnLst>
-                    </p:cTn>
-                  </p:par>
-                  <p:par>
-                    <p:cTn id="28" fill="hold">
-                      <p:stCondLst>
-                        <p:cond delay="indefinite"/>
-                      </p:stCondLst>
-                      <p:childTnLst>
-                        <p:par>
-                          <p:cTn id="29" fill="hold">
-                            <p:stCondLst>
-                              <p:cond delay="0"/>
-                            </p:stCondLst>
-                            <p:childTnLst>
-                              <p:par>
-                                <p:cTn id="30" presetID="3" presetClass="entr" presetSubtype="10" fill="hold" grpId="0" nodeType="clickEffect">
-                                  <p:stCondLst>
-                                    <p:cond delay="0"/>
-                                  </p:stCondLst>
-                                  <p:childTnLst>
-                                    <p:set>
-                                      <p:cBhvr>
-                                        <p:cTn id="31" dur="1" fill="hold">
-                                          <p:stCondLst>
-                                            <p:cond delay="0"/>
-                                          </p:stCondLst>
-                                        </p:cTn>
-                                        <p:tgtEl>
-                                          <p:spTgt spid="6">
-                                            <p:txEl>
-                                              <p:pRg st="8" end="8"/>
-                                            </p:txEl>
-                                          </p:spTgt>
-                                        </p:tgtEl>
-                                        <p:attrNameLst>
-                                          <p:attrName>style.visibility</p:attrName>
-                                        </p:attrNameLst>
-                                      </p:cBhvr>
-                                      <p:to>
-                                        <p:strVal val="visible"/>
-                                      </p:to>
-                                    </p:set>
-                                    <p:animEffect transition="in" filter="blinds(horizontal)">
-                                      <p:cBhvr>
-                                        <p:cTn id="32" dur="500"/>
-                                        <p:tgtEl>
-                                          <p:spTgt spid="6">
-                                            <p:txEl>
-                                              <p:pRg st="8" end="8"/>
-                                            </p:txEl>
-                                          </p:spTgt>
-                                        </p:tgtEl>
-                                      </p:cBhvr>
-                                    </p:animEffect>
-                                  </p:childTnLst>
-                                </p:cTn>
-                              </p:par>
-                            </p:childTnLst>
-                          </p:cTn>
-                        </p:par>
-                      </p:childTnLst>
-                    </p:cTn>
-                  </p:par>
-                  <p:par>
-                    <p:cTn id="33" fill="hold">
-                      <p:stCondLst>
-                        <p:cond delay="indefinite"/>
-                      </p:stCondLst>
-                      <p:childTnLst>
-                        <p:par>
-                          <p:cTn id="34" fill="hold">
-                            <p:stCondLst>
-                              <p:cond delay="0"/>
-                            </p:stCondLst>
-                            <p:childTnLst>
-                              <p:par>
-                                <p:cTn id="35" presetID="3" presetClass="entr" presetSubtype="10" fill="hold" grpId="0" nodeType="clickEffect">
-                                  <p:stCondLst>
-                                    <p:cond delay="0"/>
-                                  </p:stCondLst>
-                                  <p:childTnLst>
-                                    <p:set>
-                                      <p:cBhvr>
-                                        <p:cTn id="36" dur="1" fill="hold">
-                                          <p:stCondLst>
-                                            <p:cond delay="0"/>
-                                          </p:stCondLst>
-                                        </p:cTn>
-                                        <p:tgtEl>
-                                          <p:spTgt spid="6">
-                                            <p:txEl>
-                                              <p:pRg st="9" end="9"/>
-                                            </p:txEl>
-                                          </p:spTgt>
-                                        </p:tgtEl>
-                                        <p:attrNameLst>
-                                          <p:attrName>style.visibility</p:attrName>
-                                        </p:attrNameLst>
-                                      </p:cBhvr>
-                                      <p:to>
-                                        <p:strVal val="visible"/>
-                                      </p:to>
-                                    </p:set>
-                                    <p:animEffect transition="in" filter="blinds(horizontal)">
-                                      <p:cBhvr>
-                                        <p:cTn id="37" dur="500"/>
-                                        <p:tgtEl>
-                                          <p:spTgt spid="6">
-                                            <p:txEl>
-                                              <p:pRg st="9" end="9"/>
-                                            </p:txEl>
-                                          </p:spTgt>
-                                        </p:tgtEl>
-                                      </p:cBhvr>
-                                    </p:animEffect>
-                                  </p:childTnLst>
-                                </p:cTn>
-                              </p:par>
-                            </p:childTnLst>
-                          </p:cTn>
-                        </p:par>
-                      </p:childTnLst>
-                    </p:cTn>
-                  </p:par>
-                  <p:par>
-                    <p:cTn id="38" fill="hold">
-                      <p:stCondLst>
-                        <p:cond delay="indefinite"/>
-                      </p:stCondLst>
-                      <p:childTnLst>
-                        <p:par>
-                          <p:cTn id="39" fill="hold">
-                            <p:stCondLst>
-                              <p:cond delay="0"/>
-                            </p:stCondLst>
-                            <p:childTnLst>
-                              <p:par>
-                                <p:cTn id="40" presetID="3" presetClass="entr" presetSubtype="10" fill="hold" grpId="0" nodeType="clickEffect">
-                                  <p:stCondLst>
-                                    <p:cond delay="0"/>
-                                  </p:stCondLst>
-                                  <p:childTnLst>
-                                    <p:set>
-                                      <p:cBhvr>
-                                        <p:cTn id="41" dur="1" fill="hold">
-                                          <p:stCondLst>
-                                            <p:cond delay="0"/>
-                                          </p:stCondLst>
-                                        </p:cTn>
-                                        <p:tgtEl>
-                                          <p:spTgt spid="6">
-                                            <p:txEl>
-                                              <p:pRg st="10" end="10"/>
-                                            </p:txEl>
-                                          </p:spTgt>
-                                        </p:tgtEl>
-                                        <p:attrNameLst>
-                                          <p:attrName>style.visibility</p:attrName>
-                                        </p:attrNameLst>
-                                      </p:cBhvr>
-                                      <p:to>
-                                        <p:strVal val="visible"/>
-                                      </p:to>
-                                    </p:set>
-                                    <p:animEffect transition="in" filter="blinds(horizontal)">
-                                      <p:cBhvr>
-                                        <p:cTn id="42" dur="500"/>
-                                        <p:tgtEl>
-                                          <p:spTgt spid="6">
-                                            <p:txEl>
-                                              <p:pRg st="10" end="10"/>
-                                            </p:txEl>
-                                          </p:spTgt>
-                                        </p:tgtEl>
-                                      </p:cBhvr>
-                                    </p:animEffect>
-                                  </p:childTnLst>
-                                </p:cTn>
-                              </p:par>
-                            </p:childTnLst>
-                          </p:cTn>
-                        </p:par>
-                      </p:childTnLst>
-                    </p:cTn>
-                  </p:par>
-                  <p:par>
-                    <p:cTn id="43" fill="hold">
-                      <p:stCondLst>
-                        <p:cond delay="indefinite"/>
-                      </p:stCondLst>
-                      <p:childTnLst>
-                        <p:par>
-                          <p:cTn id="44" fill="hold">
-                            <p:stCondLst>
-                              <p:cond delay="0"/>
-                            </p:stCondLst>
-                            <p:childTnLst>
-                              <p:par>
-                                <p:cTn id="45" presetID="3" presetClass="entr" presetSubtype="10" fill="hold" grpId="0" nodeType="clickEffect">
-                                  <p:stCondLst>
-                                    <p:cond delay="0"/>
-                                  </p:stCondLst>
-                                  <p:childTnLst>
-                                    <p:set>
-                                      <p:cBhvr>
-                                        <p:cTn id="46" dur="1" fill="hold">
-                                          <p:stCondLst>
-                                            <p:cond delay="0"/>
-                                          </p:stCondLst>
-                                        </p:cTn>
-                                        <p:tgtEl>
-                                          <p:spTgt spid="6">
-                                            <p:txEl>
-                                              <p:pRg st="11" end="11"/>
-                                            </p:txEl>
-                                          </p:spTgt>
-                                        </p:tgtEl>
-                                        <p:attrNameLst>
-                                          <p:attrName>style.visibility</p:attrName>
-                                        </p:attrNameLst>
-                                      </p:cBhvr>
-                                      <p:to>
-                                        <p:strVal val="visible"/>
-                                      </p:to>
-                                    </p:set>
-                                    <p:animEffect transition="in" filter="blinds(horizontal)">
-                                      <p:cBhvr>
-                                        <p:cTn id="47" dur="500"/>
-                                        <p:tgtEl>
-                                          <p:spTgt spid="6">
-                                            <p:txEl>
-                                              <p:pRg st="11" end="11"/>
-                                            </p:txEl>
-                                          </p:spTgt>
-                                        </p:tgtEl>
-                                      </p:cBhvr>
-                                    </p:animEffect>
-                                  </p:childTnLst>
-                                </p:cTn>
-                              </p:par>
-                            </p:childTnLst>
-                          </p:cTn>
-                        </p:par>
-                      </p:childTnLst>
-                    </p:cTn>
-                  </p:par>
-                  <p:par>
-                    <p:cTn id="48" fill="hold">
-                      <p:stCondLst>
-                        <p:cond delay="indefinite"/>
-                      </p:stCondLst>
-                      <p:childTnLst>
-                        <p:par>
-                          <p:cTn id="49" fill="hold">
-                            <p:stCondLst>
-                              <p:cond delay="0"/>
-                            </p:stCondLst>
-                            <p:childTnLst>
-                              <p:par>
-                                <p:cTn id="50" presetID="3" presetClass="entr" presetSubtype="10" fill="hold" grpId="0" nodeType="clickEffect">
-                                  <p:stCondLst>
-                                    <p:cond delay="0"/>
-                                  </p:stCondLst>
-                                  <p:childTnLst>
-                                    <p:set>
-                                      <p:cBhvr>
-                                        <p:cTn id="51" dur="1" fill="hold">
-                                          <p:stCondLst>
-                                            <p:cond delay="0"/>
-                                          </p:stCondLst>
-                                        </p:cTn>
-                                        <p:tgtEl>
-                                          <p:spTgt spid="6">
-                                            <p:txEl>
-                                              <p:pRg st="12" end="12"/>
-                                            </p:txEl>
-                                          </p:spTgt>
-                                        </p:tgtEl>
-                                        <p:attrNameLst>
-                                          <p:attrName>style.visibility</p:attrName>
-                                        </p:attrNameLst>
-                                      </p:cBhvr>
-                                      <p:to>
-                                        <p:strVal val="visible"/>
-                                      </p:to>
-                                    </p:set>
-                                    <p:animEffect transition="in" filter="blinds(horizontal)">
-                                      <p:cBhvr>
-                                        <p:cTn id="52" dur="500"/>
-                                        <p:tgtEl>
-                                          <p:spTgt spid="6">
-                                            <p:txEl>
-                                              <p:pRg st="12" end="12"/>
-                                            </p:txEl>
-                                          </p:spTgt>
-                                        </p:tgtEl>
-                                      </p:cBhvr>
-                                    </p:animEffect>
-                                  </p:childTnLst>
-                                </p:cTn>
-                              </p:par>
-                            </p:childTnLst>
-                          </p:cTn>
-                        </p:par>
-                      </p:childTnLst>
-                    </p:cTn>
-                  </p:par>
-                </p:childTnLst>
-              </p:cTn>
-              <p:prevCondLst>
-                <p:cond evt="onPrev" delay="0">
-                  <p:tgtEl>
-                    <p:sldTgt/>
-                  </p:tgtEl>
-                </p:cond>
-              </p:prevCondLst>
-              <p:nextCondLst>
-                <p:cond evt="onNext" delay="0">
-                  <p:tgtEl>
-                    <p:sldTgt/>
-                  </p:tgtEl>
-                </p:cond>
-              </p:nextCondLst>
-            </p:seq>
-          </p:childTnLst>
-        </p:cTn>
+        <p:cTn xmlns:p14="http://schemas.microsoft.com/office/powerpoint/2010/main" id="1" dur="indefinite" restart="never" nodeType="tmRoot"/>
       </p:par>
     </p:tnLst>
-    <p:bldLst>
-      <p:bldP spid="6" grpId="0" build="p" bldLvl="2" animBg="1"/>
-    </p:bldLst>
   </p:timing>
 </p:sld>
 </file>
@@ -9065,7 +8174,7 @@
         <p:spPr>
           <a:xfrm>
             <a:off x="457200" y="838200"/>
-            <a:ext cx="8229600" cy="5355313"/>
+            <a:ext cx="8229600" cy="5632312"/>
           </a:xfrm>
           <a:prstGeom prst="rect">
             <a:avLst/>
@@ -9118,16 +8227,23 @@
           </a:p>
           <a:p>
             <a:pPr algn="just"/>
-            <a:r>
-              <a:rPr lang="en-US" dirty="0" smtClean="0">
-                <a:solidFill>
-                  <a:schemeClr val="accent1">
-                    <a:lumMod val="75000"/>
-                  </a:schemeClr>
-                </a:solidFill>
-              </a:rPr>
-              <a:t>[Note:                                                                            ]</a:t>
-            </a:r>
+            <a:endParaRPr lang="en-US" dirty="0" smtClean="0">
+              <a:solidFill>
+                <a:schemeClr val="accent1">
+                  <a:lumMod val="75000"/>
+                </a:schemeClr>
+              </a:solidFill>
+            </a:endParaRPr>
+          </a:p>
+          <a:p>
+            <a:pPr algn="just"/>
+            <a:endParaRPr lang="en-US" dirty="0">
+              <a:solidFill>
+                <a:schemeClr val="accent1">
+                  <a:lumMod val="75000"/>
+                </a:schemeClr>
+              </a:solidFill>
+            </a:endParaRPr>
           </a:p>
           <a:p>
             <a:pPr algn="just"/>
@@ -9240,8 +8356,25 @@
                   </a:schemeClr>
                 </a:solidFill>
               </a:rPr>
-              <a:t>	- Take logarithm,</a:t>
-            </a:r>
+              <a:t>	- </a:t>
+            </a:r>
+            <a:r>
+              <a:rPr lang="en-US" dirty="0" smtClean="0">
+                <a:solidFill>
+                  <a:schemeClr val="accent1">
+                    <a:lumMod val="75000"/>
+                  </a:schemeClr>
+                </a:solidFill>
+              </a:rPr>
+              <a:t>Take the log,</a:t>
+            </a:r>
+            <a:endParaRPr lang="en-US" dirty="0" smtClean="0">
+              <a:solidFill>
+                <a:schemeClr val="accent1">
+                  <a:lumMod val="75000"/>
+                </a:schemeClr>
+              </a:solidFill>
+            </a:endParaRPr>
           </a:p>
           <a:p>
             <a:pPr algn="just"/>
@@ -9263,8 +8396,25 @@
                   </a:schemeClr>
                 </a:solidFill>
               </a:rPr>
-              <a:t>- Take derivatives with respect to each parameters</a:t>
-            </a:r>
+              <a:t>- Take derivatives with respect to each </a:t>
+            </a:r>
+            <a:r>
+              <a:rPr lang="en-US" dirty="0" smtClean="0">
+                <a:solidFill>
+                  <a:schemeClr val="accent1">
+                    <a:lumMod val="75000"/>
+                  </a:schemeClr>
+                </a:solidFill>
+              </a:rPr>
+              <a:t>parameter</a:t>
+            </a:r>
+            <a:endParaRPr lang="en-US" dirty="0" smtClean="0">
+              <a:solidFill>
+                <a:schemeClr val="accent1">
+                  <a:lumMod val="75000"/>
+                </a:schemeClr>
+              </a:solidFill>
+            </a:endParaRPr>
           </a:p>
           <a:p>
             <a:pPr algn="just"/>
@@ -9416,20 +8566,20 @@
           <p:nvPr>
             <p:extLst>
               <p:ext uri="{D42A27DB-BD31-4B8C-83A1-F6EECF244321}">
-                <p14:modId xmlns:p14="http://schemas.microsoft.com/office/powerpoint/2010/main" val="1467581881"/>
+                <p14:modId xmlns:p14="http://schemas.microsoft.com/office/powerpoint/2010/main" val="3611429606"/>
               </p:ext>
             </p:extLst>
           </p:nvPr>
         </p:nvGraphicFramePr>
         <p:xfrm>
-          <a:off x="4267200" y="990600"/>
-          <a:ext cx="2744787" cy="609600"/>
+          <a:off x="2209799" y="1447800"/>
+          <a:ext cx="4117181" cy="914400"/>
         </p:xfrm>
         <a:graphic>
           <a:graphicData uri="http://schemas.openxmlformats.org/presentationml/2006/ole">
             <mc:AlternateContent xmlns:mc="http://schemas.openxmlformats.org/markup-compatibility/2006">
               <mc:Choice xmlns:v="urn:schemas-microsoft-com:vml" Requires="v">
-                <p:oleObj spid="_x0000_s3102" name="Equation" r:id="rId4" imgW="2057400" imgH="457200" progId="Equation.3">
+                <p:oleObj spid="_x0000_s3108" name="Equation" r:id="rId4" imgW="2057400" imgH="457200" progId="Equation.3">
                   <p:embed/>
                 </p:oleObj>
               </mc:Choice>
@@ -9450,65 +8600,8 @@
                     </p:blipFill>
                     <p:spPr>
                       <a:xfrm>
-                        <a:off x="4267200" y="990600"/>
-                        <a:ext cx="2744787" cy="609600"/>
-                      </a:xfrm>
-                      <a:prstGeom prst="rect">
-                        <a:avLst/>
-                      </a:prstGeom>
-                    </p:spPr>
-                  </p:pic>
-                </p:oleObj>
-              </mc:Fallback>
-            </mc:AlternateContent>
-          </a:graphicData>
-        </a:graphic>
-      </p:graphicFrame>
-      <p:graphicFrame>
-        <p:nvGraphicFramePr>
-          <p:cNvPr id="7" name="Object 6"/>
-          <p:cNvGraphicFramePr>
-            <a:graphicFrameLocks noChangeAspect="1"/>
-          </p:cNvGraphicFramePr>
-          <p:nvPr>
-            <p:extLst>
-              <p:ext uri="{D42A27DB-BD31-4B8C-83A1-F6EECF244321}">
-                <p14:modId xmlns:p14="http://schemas.microsoft.com/office/powerpoint/2010/main" val="4112133795"/>
-              </p:ext>
-            </p:extLst>
-          </p:nvPr>
-        </p:nvGraphicFramePr>
-        <p:xfrm>
-          <a:off x="1219200" y="1631960"/>
-          <a:ext cx="3657600" cy="425440"/>
-        </p:xfrm>
-        <a:graphic>
-          <a:graphicData uri="http://schemas.openxmlformats.org/presentationml/2006/ole">
-            <mc:AlternateContent xmlns:mc="http://schemas.openxmlformats.org/markup-compatibility/2006">
-              <mc:Choice xmlns:v="urn:schemas-microsoft-com:vml" Requires="v">
-                <p:oleObj spid="_x0000_s3103" name="Equation" r:id="rId6" imgW="2946400" imgH="342900" progId="Equation.3">
-                  <p:embed/>
-                </p:oleObj>
-              </mc:Choice>
-              <mc:Fallback>
-                <p:oleObj name="Equation" r:id="rId6" imgW="2946400" imgH="342900" progId="Equation.3">
-                  <p:embed/>
-                  <p:pic>
-                    <p:nvPicPr>
-                      <p:cNvPr id="0" name=""/>
-                      <p:cNvPicPr/>
-                      <p:nvPr/>
-                    </p:nvPicPr>
-                    <p:blipFill>
-                      <a:blip r:embed="rId7"/>
-                      <a:stretch>
-                        <a:fillRect/>
-                      </a:stretch>
-                    </p:blipFill>
-                    <p:spPr>
-                      <a:xfrm>
-                        <a:off x="1219200" y="1631960"/>
-                        <a:ext cx="3657600" cy="425440"/>
+                        <a:off x="2209799" y="1447800"/>
+                        <a:ext cx="4117181" cy="914400"/>
                       </a:xfrm>
                       <a:prstGeom prst="rect">
                         <a:avLst/>
@@ -9530,25 +8623,25 @@
           <p:nvPr>
             <p:extLst>
               <p:ext uri="{D42A27DB-BD31-4B8C-83A1-F6EECF244321}">
-                <p14:modId xmlns:p14="http://schemas.microsoft.com/office/powerpoint/2010/main" val="1213781349"/>
+                <p14:modId xmlns:p14="http://schemas.microsoft.com/office/powerpoint/2010/main" val="4292067654"/>
               </p:ext>
             </p:extLst>
           </p:nvPr>
         </p:nvGraphicFramePr>
         <p:xfrm>
-          <a:off x="1447800" y="2819400"/>
-          <a:ext cx="4489450" cy="508000"/>
+          <a:off x="703263" y="2987675"/>
+          <a:ext cx="7548562" cy="822325"/>
         </p:xfrm>
         <a:graphic>
           <a:graphicData uri="http://schemas.openxmlformats.org/presentationml/2006/ole">
             <mc:AlternateContent xmlns:mc="http://schemas.openxmlformats.org/markup-compatibility/2006">
               <mc:Choice xmlns:v="urn:schemas-microsoft-com:vml" Requires="v">
-                <p:oleObj spid="_x0000_s3104" name="Equation" r:id="rId8" imgW="3365500" imgH="381000" progId="Equation.3">
+                <p:oleObj spid="_x0000_s3109" name="Equation" r:id="rId6" imgW="4191000" imgH="457200" progId="Equation.3">
                   <p:embed/>
                 </p:oleObj>
               </mc:Choice>
               <mc:Fallback>
-                <p:oleObj name="Equation" r:id="rId8" imgW="3365500" imgH="381000" progId="Equation.3">
+                <p:oleObj name="Equation" r:id="rId6" imgW="4191000" imgH="457200" progId="Equation.3">
                   <p:embed/>
                   <p:pic>
                     <p:nvPicPr>
@@ -9557,15 +8650,15 @@
                       <p:nvPr/>
                     </p:nvPicPr>
                     <p:blipFill>
-                      <a:blip r:embed="rId9"/>
+                      <a:blip r:embed="rId7"/>
                       <a:stretch>
                         <a:fillRect/>
                       </a:stretch>
                     </p:blipFill>
                     <p:spPr>
                       <a:xfrm>
-                        <a:off x="1447800" y="2819400"/>
-                        <a:ext cx="4489450" cy="508000"/>
+                        <a:off x="703263" y="2987675"/>
+                        <a:ext cx="7548562" cy="822325"/>
                       </a:xfrm>
                       <a:prstGeom prst="rect">
                         <a:avLst/>
@@ -9591,641 +8684,9 @@
   <p:timing>
     <p:tnLst>
       <p:par>
-        <p:cTn xmlns:p14="http://schemas.microsoft.com/office/powerpoint/2010/main" id="1" dur="indefinite" restart="never" nodeType="tmRoot">
-          <p:childTnLst>
-            <p:seq concurrent="1" nextAc="seek">
-              <p:cTn id="2" dur="indefinite" nodeType="mainSeq">
-                <p:childTnLst>
-                  <p:par>
-                    <p:cTn id="3" fill="hold">
-                      <p:stCondLst>
-                        <p:cond delay="indefinite"/>
-                      </p:stCondLst>
-                      <p:childTnLst>
-                        <p:par>
-                          <p:cTn id="4" fill="hold">
-                            <p:stCondLst>
-                              <p:cond delay="0"/>
-                            </p:stCondLst>
-                            <p:childTnLst>
-                              <p:par>
-                                <p:cTn id="5" presetID="3" presetClass="entr" presetSubtype="10" fill="hold" grpId="0" nodeType="clickEffect">
-                                  <p:stCondLst>
-                                    <p:cond delay="0"/>
-                                  </p:stCondLst>
-                                  <p:childTnLst>
-                                    <p:set>
-                                      <p:cBhvr>
-                                        <p:cTn id="6" dur="1" fill="hold">
-                                          <p:stCondLst>
-                                            <p:cond delay="0"/>
-                                          </p:stCondLst>
-                                        </p:cTn>
-                                        <p:tgtEl>
-                                          <p:spTgt spid="6">
-                                            <p:bg/>
-                                          </p:spTgt>
-                                        </p:tgtEl>
-                                        <p:attrNameLst>
-                                          <p:attrName>style.visibility</p:attrName>
-                                        </p:attrNameLst>
-                                      </p:cBhvr>
-                                      <p:to>
-                                        <p:strVal val="visible"/>
-                                      </p:to>
-                                    </p:set>
-                                    <p:animEffect transition="in" filter="blinds(horizontal)">
-                                      <p:cBhvr>
-                                        <p:cTn id="7" dur="500"/>
-                                        <p:tgtEl>
-                                          <p:spTgt spid="6">
-                                            <p:bg/>
-                                          </p:spTgt>
-                                        </p:tgtEl>
-                                      </p:cBhvr>
-                                    </p:animEffect>
-                                  </p:childTnLst>
-                                </p:cTn>
-                              </p:par>
-                            </p:childTnLst>
-                          </p:cTn>
-                        </p:par>
-                      </p:childTnLst>
-                    </p:cTn>
-                  </p:par>
-                  <p:par>
-                    <p:cTn id="8" fill="hold">
-                      <p:stCondLst>
-                        <p:cond delay="indefinite"/>
-                      </p:stCondLst>
-                      <p:childTnLst>
-                        <p:par>
-                          <p:cTn id="9" fill="hold">
-                            <p:stCondLst>
-                              <p:cond delay="0"/>
-                            </p:stCondLst>
-                            <p:childTnLst>
-                              <p:par>
-                                <p:cTn id="10" presetID="3" presetClass="entr" presetSubtype="10" fill="hold" grpId="0" nodeType="clickEffect">
-                                  <p:stCondLst>
-                                    <p:cond delay="0"/>
-                                  </p:stCondLst>
-                                  <p:childTnLst>
-                                    <p:set>
-                                      <p:cBhvr>
-                                        <p:cTn id="11" dur="1" fill="hold">
-                                          <p:stCondLst>
-                                            <p:cond delay="0"/>
-                                          </p:stCondLst>
-                                        </p:cTn>
-                                        <p:tgtEl>
-                                          <p:spTgt spid="6">
-                                            <p:txEl>
-                                              <p:pRg st="1" end="1"/>
-                                            </p:txEl>
-                                          </p:spTgt>
-                                        </p:tgtEl>
-                                        <p:attrNameLst>
-                                          <p:attrName>style.visibility</p:attrName>
-                                        </p:attrNameLst>
-                                      </p:cBhvr>
-                                      <p:to>
-                                        <p:strVal val="visible"/>
-                                      </p:to>
-                                    </p:set>
-                                    <p:animEffect transition="in" filter="blinds(horizontal)">
-                                      <p:cBhvr>
-                                        <p:cTn id="12" dur="500"/>
-                                        <p:tgtEl>
-                                          <p:spTgt spid="6">
-                                            <p:txEl>
-                                              <p:pRg st="1" end="1"/>
-                                            </p:txEl>
-                                          </p:spTgt>
-                                        </p:tgtEl>
-                                      </p:cBhvr>
-                                    </p:animEffect>
-                                  </p:childTnLst>
-                                </p:cTn>
-                              </p:par>
-                            </p:childTnLst>
-                          </p:cTn>
-                        </p:par>
-                      </p:childTnLst>
-                    </p:cTn>
-                  </p:par>
-                  <p:par>
-                    <p:cTn id="13" fill="hold">
-                      <p:stCondLst>
-                        <p:cond delay="indefinite"/>
-                      </p:stCondLst>
-                      <p:childTnLst>
-                        <p:par>
-                          <p:cTn id="14" fill="hold">
-                            <p:stCondLst>
-                              <p:cond delay="0"/>
-                            </p:stCondLst>
-                            <p:childTnLst>
-                              <p:par>
-                                <p:cTn id="15" presetID="3" presetClass="entr" presetSubtype="10" fill="hold" grpId="0" nodeType="clickEffect">
-                                  <p:stCondLst>
-                                    <p:cond delay="0"/>
-                                  </p:stCondLst>
-                                  <p:childTnLst>
-                                    <p:set>
-                                      <p:cBhvr>
-                                        <p:cTn id="16" dur="1" fill="hold">
-                                          <p:stCondLst>
-                                            <p:cond delay="0"/>
-                                          </p:stCondLst>
-                                        </p:cTn>
-                                        <p:tgtEl>
-                                          <p:spTgt spid="6">
-                                            <p:txEl>
-                                              <p:pRg st="3" end="3"/>
-                                            </p:txEl>
-                                          </p:spTgt>
-                                        </p:tgtEl>
-                                        <p:attrNameLst>
-                                          <p:attrName>style.visibility</p:attrName>
-                                        </p:attrNameLst>
-                                      </p:cBhvr>
-                                      <p:to>
-                                        <p:strVal val="visible"/>
-                                      </p:to>
-                                    </p:set>
-                                    <p:animEffect transition="in" filter="blinds(horizontal)">
-                                      <p:cBhvr>
-                                        <p:cTn id="17" dur="500"/>
-                                        <p:tgtEl>
-                                          <p:spTgt spid="6">
-                                            <p:txEl>
-                                              <p:pRg st="3" end="3"/>
-                                            </p:txEl>
-                                          </p:spTgt>
-                                        </p:tgtEl>
-                                      </p:cBhvr>
-                                    </p:animEffect>
-                                  </p:childTnLst>
-                                </p:cTn>
-                              </p:par>
-                            </p:childTnLst>
-                          </p:cTn>
-                        </p:par>
-                      </p:childTnLst>
-                    </p:cTn>
-                  </p:par>
-                  <p:par>
-                    <p:cTn id="18" fill="hold">
-                      <p:stCondLst>
-                        <p:cond delay="indefinite"/>
-                      </p:stCondLst>
-                      <p:childTnLst>
-                        <p:par>
-                          <p:cTn id="19" fill="hold">
-                            <p:stCondLst>
-                              <p:cond delay="0"/>
-                            </p:stCondLst>
-                            <p:childTnLst>
-                              <p:par>
-                                <p:cTn id="20" presetID="3" presetClass="entr" presetSubtype="10" fill="hold" grpId="0" nodeType="clickEffect">
-                                  <p:stCondLst>
-                                    <p:cond delay="0"/>
-                                  </p:stCondLst>
-                                  <p:childTnLst>
-                                    <p:set>
-                                      <p:cBhvr>
-                                        <p:cTn id="21" dur="1" fill="hold">
-                                          <p:stCondLst>
-                                            <p:cond delay="0"/>
-                                          </p:stCondLst>
-                                        </p:cTn>
-                                        <p:tgtEl>
-                                          <p:spTgt spid="6">
-                                            <p:txEl>
-                                              <p:pRg st="5" end="5"/>
-                                            </p:txEl>
-                                          </p:spTgt>
-                                        </p:tgtEl>
-                                        <p:attrNameLst>
-                                          <p:attrName>style.visibility</p:attrName>
-                                        </p:attrNameLst>
-                                      </p:cBhvr>
-                                      <p:to>
-                                        <p:strVal val="visible"/>
-                                      </p:to>
-                                    </p:set>
-                                    <p:animEffect transition="in" filter="blinds(horizontal)">
-                                      <p:cBhvr>
-                                        <p:cTn id="22" dur="500"/>
-                                        <p:tgtEl>
-                                          <p:spTgt spid="6">
-                                            <p:txEl>
-                                              <p:pRg st="5" end="5"/>
-                                            </p:txEl>
-                                          </p:spTgt>
-                                        </p:tgtEl>
-                                      </p:cBhvr>
-                                    </p:animEffect>
-                                  </p:childTnLst>
-                                </p:cTn>
-                              </p:par>
-                            </p:childTnLst>
-                          </p:cTn>
-                        </p:par>
-                      </p:childTnLst>
-                    </p:cTn>
-                  </p:par>
-                  <p:par>
-                    <p:cTn id="23" fill="hold">
-                      <p:stCondLst>
-                        <p:cond delay="indefinite"/>
-                      </p:stCondLst>
-                      <p:childTnLst>
-                        <p:par>
-                          <p:cTn id="24" fill="hold">
-                            <p:stCondLst>
-                              <p:cond delay="0"/>
-                            </p:stCondLst>
-                            <p:childTnLst>
-                              <p:par>
-                                <p:cTn id="25" presetID="3" presetClass="entr" presetSubtype="10" fill="hold" grpId="0" nodeType="clickEffect">
-                                  <p:stCondLst>
-                                    <p:cond delay="0"/>
-                                  </p:stCondLst>
-                                  <p:childTnLst>
-                                    <p:set>
-                                      <p:cBhvr>
-                                        <p:cTn id="26" dur="1" fill="hold">
-                                          <p:stCondLst>
-                                            <p:cond delay="0"/>
-                                          </p:stCondLst>
-                                        </p:cTn>
-                                        <p:tgtEl>
-                                          <p:spTgt spid="6">
-                                            <p:txEl>
-                                              <p:pRg st="10" end="10"/>
-                                            </p:txEl>
-                                          </p:spTgt>
-                                        </p:tgtEl>
-                                        <p:attrNameLst>
-                                          <p:attrName>style.visibility</p:attrName>
-                                        </p:attrNameLst>
-                                      </p:cBhvr>
-                                      <p:to>
-                                        <p:strVal val="visible"/>
-                                      </p:to>
-                                    </p:set>
-                                    <p:animEffect transition="in" filter="blinds(horizontal)">
-                                      <p:cBhvr>
-                                        <p:cTn id="27" dur="500"/>
-                                        <p:tgtEl>
-                                          <p:spTgt spid="6">
-                                            <p:txEl>
-                                              <p:pRg st="10" end="10"/>
-                                            </p:txEl>
-                                          </p:spTgt>
-                                        </p:tgtEl>
-                                      </p:cBhvr>
-                                    </p:animEffect>
-                                  </p:childTnLst>
-                                </p:cTn>
-                              </p:par>
-                            </p:childTnLst>
-                          </p:cTn>
-                        </p:par>
-                      </p:childTnLst>
-                    </p:cTn>
-                  </p:par>
-                  <p:par>
-                    <p:cTn id="28" fill="hold">
-                      <p:stCondLst>
-                        <p:cond delay="indefinite"/>
-                      </p:stCondLst>
-                      <p:childTnLst>
-                        <p:par>
-                          <p:cTn id="29" fill="hold">
-                            <p:stCondLst>
-                              <p:cond delay="0"/>
-                            </p:stCondLst>
-                            <p:childTnLst>
-                              <p:par>
-                                <p:cTn id="30" presetID="3" presetClass="entr" presetSubtype="10" fill="hold" grpId="0" nodeType="clickEffect">
-                                  <p:stCondLst>
-                                    <p:cond delay="0"/>
-                                  </p:stCondLst>
-                                  <p:childTnLst>
-                                    <p:set>
-                                      <p:cBhvr>
-                                        <p:cTn id="31" dur="1" fill="hold">
-                                          <p:stCondLst>
-                                            <p:cond delay="0"/>
-                                          </p:stCondLst>
-                                        </p:cTn>
-                                        <p:tgtEl>
-                                          <p:spTgt spid="6">
-                                            <p:txEl>
-                                              <p:pRg st="11" end="11"/>
-                                            </p:txEl>
-                                          </p:spTgt>
-                                        </p:tgtEl>
-                                        <p:attrNameLst>
-                                          <p:attrName>style.visibility</p:attrName>
-                                        </p:attrNameLst>
-                                      </p:cBhvr>
-                                      <p:to>
-                                        <p:strVal val="visible"/>
-                                      </p:to>
-                                    </p:set>
-                                    <p:animEffect transition="in" filter="blinds(horizontal)">
-                                      <p:cBhvr>
-                                        <p:cTn id="32" dur="500"/>
-                                        <p:tgtEl>
-                                          <p:spTgt spid="6">
-                                            <p:txEl>
-                                              <p:pRg st="11" end="11"/>
-                                            </p:txEl>
-                                          </p:spTgt>
-                                        </p:tgtEl>
-                                      </p:cBhvr>
-                                    </p:animEffect>
-                                  </p:childTnLst>
-                                </p:cTn>
-                              </p:par>
-                            </p:childTnLst>
-                          </p:cTn>
-                        </p:par>
-                      </p:childTnLst>
-                    </p:cTn>
-                  </p:par>
-                  <p:par>
-                    <p:cTn id="33" fill="hold">
-                      <p:stCondLst>
-                        <p:cond delay="indefinite"/>
-                      </p:stCondLst>
-                      <p:childTnLst>
-                        <p:par>
-                          <p:cTn id="34" fill="hold">
-                            <p:stCondLst>
-                              <p:cond delay="0"/>
-                            </p:stCondLst>
-                            <p:childTnLst>
-                              <p:par>
-                                <p:cTn id="35" presetID="3" presetClass="entr" presetSubtype="10" fill="hold" grpId="0" nodeType="clickEffect">
-                                  <p:stCondLst>
-                                    <p:cond delay="0"/>
-                                  </p:stCondLst>
-                                  <p:childTnLst>
-                                    <p:set>
-                                      <p:cBhvr>
-                                        <p:cTn id="36" dur="1" fill="hold">
-                                          <p:stCondLst>
-                                            <p:cond delay="0"/>
-                                          </p:stCondLst>
-                                        </p:cTn>
-                                        <p:tgtEl>
-                                          <p:spTgt spid="6">
-                                            <p:txEl>
-                                              <p:pRg st="12" end="12"/>
-                                            </p:txEl>
-                                          </p:spTgt>
-                                        </p:tgtEl>
-                                        <p:attrNameLst>
-                                          <p:attrName>style.visibility</p:attrName>
-                                        </p:attrNameLst>
-                                      </p:cBhvr>
-                                      <p:to>
-                                        <p:strVal val="visible"/>
-                                      </p:to>
-                                    </p:set>
-                                    <p:animEffect transition="in" filter="blinds(horizontal)">
-                                      <p:cBhvr>
-                                        <p:cTn id="37" dur="500"/>
-                                        <p:tgtEl>
-                                          <p:spTgt spid="6">
-                                            <p:txEl>
-                                              <p:pRg st="12" end="12"/>
-                                            </p:txEl>
-                                          </p:spTgt>
-                                        </p:tgtEl>
-                                      </p:cBhvr>
-                                    </p:animEffect>
-                                  </p:childTnLst>
-                                </p:cTn>
-                              </p:par>
-                            </p:childTnLst>
-                          </p:cTn>
-                        </p:par>
-                      </p:childTnLst>
-                    </p:cTn>
-                  </p:par>
-                  <p:par>
-                    <p:cTn id="38" fill="hold">
-                      <p:stCondLst>
-                        <p:cond delay="indefinite"/>
-                      </p:stCondLst>
-                      <p:childTnLst>
-                        <p:par>
-                          <p:cTn id="39" fill="hold">
-                            <p:stCondLst>
-                              <p:cond delay="0"/>
-                            </p:stCondLst>
-                            <p:childTnLst>
-                              <p:par>
-                                <p:cTn id="40" presetID="3" presetClass="entr" presetSubtype="10" fill="hold" grpId="0" nodeType="clickEffect">
-                                  <p:stCondLst>
-                                    <p:cond delay="0"/>
-                                  </p:stCondLst>
-                                  <p:childTnLst>
-                                    <p:set>
-                                      <p:cBhvr>
-                                        <p:cTn id="41" dur="1" fill="hold">
-                                          <p:stCondLst>
-                                            <p:cond delay="0"/>
-                                          </p:stCondLst>
-                                        </p:cTn>
-                                        <p:tgtEl>
-                                          <p:spTgt spid="6">
-                                            <p:txEl>
-                                              <p:pRg st="13" end="13"/>
-                                            </p:txEl>
-                                          </p:spTgt>
-                                        </p:tgtEl>
-                                        <p:attrNameLst>
-                                          <p:attrName>style.visibility</p:attrName>
-                                        </p:attrNameLst>
-                                      </p:cBhvr>
-                                      <p:to>
-                                        <p:strVal val="visible"/>
-                                      </p:to>
-                                    </p:set>
-                                    <p:animEffect transition="in" filter="blinds(horizontal)">
-                                      <p:cBhvr>
-                                        <p:cTn id="42" dur="500"/>
-                                        <p:tgtEl>
-                                          <p:spTgt spid="6">
-                                            <p:txEl>
-                                              <p:pRg st="13" end="13"/>
-                                            </p:txEl>
-                                          </p:spTgt>
-                                        </p:tgtEl>
-                                      </p:cBhvr>
-                                    </p:animEffect>
-                                  </p:childTnLst>
-                                </p:cTn>
-                              </p:par>
-                            </p:childTnLst>
-                          </p:cTn>
-                        </p:par>
-                      </p:childTnLst>
-                    </p:cTn>
-                  </p:par>
-                  <p:par>
-                    <p:cTn id="43" fill="hold">
-                      <p:stCondLst>
-                        <p:cond delay="indefinite"/>
-                      </p:stCondLst>
-                      <p:childTnLst>
-                        <p:par>
-                          <p:cTn id="44" fill="hold">
-                            <p:stCondLst>
-                              <p:cond delay="0"/>
-                            </p:stCondLst>
-                            <p:childTnLst>
-                              <p:par>
-                                <p:cTn id="45" presetID="3" presetClass="entr" presetSubtype="10" fill="hold" grpId="0" nodeType="clickEffect">
-                                  <p:stCondLst>
-                                    <p:cond delay="0"/>
-                                  </p:stCondLst>
-                                  <p:childTnLst>
-                                    <p:set>
-                                      <p:cBhvr>
-                                        <p:cTn id="46" dur="1" fill="hold">
-                                          <p:stCondLst>
-                                            <p:cond delay="0"/>
-                                          </p:stCondLst>
-                                        </p:cTn>
-                                        <p:tgtEl>
-                                          <p:spTgt spid="6">
-                                            <p:txEl>
-                                              <p:pRg st="14" end="14"/>
-                                            </p:txEl>
-                                          </p:spTgt>
-                                        </p:tgtEl>
-                                        <p:attrNameLst>
-                                          <p:attrName>style.visibility</p:attrName>
-                                        </p:attrNameLst>
-                                      </p:cBhvr>
-                                      <p:to>
-                                        <p:strVal val="visible"/>
-                                      </p:to>
-                                    </p:set>
-                                    <p:animEffect transition="in" filter="blinds(horizontal)">
-                                      <p:cBhvr>
-                                        <p:cTn id="47" dur="500"/>
-                                        <p:tgtEl>
-                                          <p:spTgt spid="6">
-                                            <p:txEl>
-                                              <p:pRg st="14" end="14"/>
-                                            </p:txEl>
-                                          </p:spTgt>
-                                        </p:tgtEl>
-                                      </p:cBhvr>
-                                    </p:animEffect>
-                                  </p:childTnLst>
-                                </p:cTn>
-                              </p:par>
-                            </p:childTnLst>
-                          </p:cTn>
-                        </p:par>
-                      </p:childTnLst>
-                    </p:cTn>
-                  </p:par>
-                  <p:par>
-                    <p:cTn id="48" fill="hold">
-                      <p:stCondLst>
-                        <p:cond delay="indefinite"/>
-                      </p:stCondLst>
-                      <p:childTnLst>
-                        <p:par>
-                          <p:cTn id="49" fill="hold">
-                            <p:stCondLst>
-                              <p:cond delay="0"/>
-                            </p:stCondLst>
-                            <p:childTnLst>
-                              <p:par>
-                                <p:cTn id="50" presetID="3" presetClass="entr" presetSubtype="10" fill="hold" grpId="0" nodeType="clickEffect">
-                                  <p:stCondLst>
-                                    <p:cond delay="0"/>
-                                  </p:stCondLst>
-                                  <p:childTnLst>
-                                    <p:set>
-                                      <p:cBhvr>
-                                        <p:cTn id="51" dur="1" fill="hold">
-                                          <p:stCondLst>
-                                            <p:cond delay="0"/>
-                                          </p:stCondLst>
-                                        </p:cTn>
-                                        <p:tgtEl>
-                                          <p:spTgt spid="6">
-                                            <p:txEl>
-                                              <p:pRg st="15" end="15"/>
-                                            </p:txEl>
-                                          </p:spTgt>
-                                        </p:tgtEl>
-                                        <p:attrNameLst>
-                                          <p:attrName>style.visibility</p:attrName>
-                                        </p:attrNameLst>
-                                      </p:cBhvr>
-                                      <p:to>
-                                        <p:strVal val="visible"/>
-                                      </p:to>
-                                    </p:set>
-                                    <p:animEffect transition="in" filter="blinds(horizontal)">
-                                      <p:cBhvr>
-                                        <p:cTn id="52" dur="500"/>
-                                        <p:tgtEl>
-                                          <p:spTgt spid="6">
-                                            <p:txEl>
-                                              <p:pRg st="15" end="15"/>
-                                            </p:txEl>
-                                          </p:spTgt>
-                                        </p:tgtEl>
-                                      </p:cBhvr>
-                                    </p:animEffect>
-                                  </p:childTnLst>
-                                </p:cTn>
-                              </p:par>
-                            </p:childTnLst>
-                          </p:cTn>
-                        </p:par>
-                      </p:childTnLst>
-                    </p:cTn>
-                  </p:par>
-                </p:childTnLst>
-              </p:cTn>
-              <p:prevCondLst>
-                <p:cond evt="onPrev" delay="0">
-                  <p:tgtEl>
-                    <p:sldTgt/>
-                  </p:tgtEl>
-                </p:cond>
-              </p:prevCondLst>
-              <p:nextCondLst>
-                <p:cond evt="onNext" delay="0">
-                  <p:tgtEl>
-                    <p:sldTgt/>
-                  </p:tgtEl>
-                </p:cond>
-              </p:nextCondLst>
-            </p:seq>
-          </p:childTnLst>
-        </p:cTn>
+        <p:cTn xmlns:p14="http://schemas.microsoft.com/office/powerpoint/2010/main" id="1" dur="indefinite" restart="never" nodeType="tmRoot"/>
       </p:par>
     </p:tnLst>
-    <p:bldLst>
-      <p:bldP spid="6" grpId="0" build="p" bldLvl="2" animBg="1"/>
-    </p:bldLst>
   </p:timing>
 </p:sld>
 </file>
@@ -10329,7 +8790,7 @@
         <p:spPr>
           <a:xfrm>
             <a:off x="457200" y="838200"/>
-            <a:ext cx="8229600" cy="2308324"/>
+            <a:ext cx="8229600" cy="2585323"/>
           </a:xfrm>
           <a:prstGeom prst="rect">
             <a:avLst/>
@@ -10430,6 +8891,19 @@
               <a:buFont typeface="Symbol" charset="0"/>
               <a:buChar char=""/>
             </a:pPr>
+            <a:endParaRPr lang="en-US" dirty="0" smtClean="0">
+              <a:solidFill>
+                <a:schemeClr val="accent1">
+                  <a:lumMod val="75000"/>
+                </a:schemeClr>
+              </a:solidFill>
+            </a:endParaRPr>
+          </a:p>
+          <a:p>
+            <a:pPr marL="285750" indent="-285750" algn="just">
+              <a:buFont typeface="Symbol" charset="0"/>
+              <a:buChar char=""/>
+            </a:pPr>
             <a:r>
               <a:rPr lang="en-US" dirty="0" smtClean="0">
                 <a:solidFill>
@@ -10438,7 +8912,17 @@
                   </a:schemeClr>
                 </a:solidFill>
               </a:rPr>
-              <a:t>Discuss: Bias and Variance of the MLE; approximate 95% CI.</a:t>
+              <a:t>Discuss</a:t>
+            </a:r>
+            <a:r>
+              <a:rPr lang="en-US" dirty="0" smtClean="0">
+                <a:solidFill>
+                  <a:schemeClr val="accent1">
+                    <a:lumMod val="75000"/>
+                  </a:schemeClr>
+                </a:solidFill>
+              </a:rPr>
+              <a:t>: Bias and Variance of the MLE; approximate 95% CI.</a:t>
             </a:r>
             <a:endParaRPr lang="en-US" dirty="0">
               <a:solidFill>
@@ -10469,20 +8953,20 @@
           <p:nvPr>
             <p:extLst>
               <p:ext uri="{D42A27DB-BD31-4B8C-83A1-F6EECF244321}">
-                <p14:modId xmlns:p14="http://schemas.microsoft.com/office/powerpoint/2010/main" val="2255627610"/>
+                <p14:modId xmlns:p14="http://schemas.microsoft.com/office/powerpoint/2010/main" val="1611859989"/>
               </p:ext>
             </p:extLst>
           </p:nvPr>
         </p:nvGraphicFramePr>
         <p:xfrm>
-          <a:off x="1912938" y="1651000"/>
-          <a:ext cx="3795712" cy="660400"/>
+          <a:off x="2116566" y="1676400"/>
+          <a:ext cx="4817634" cy="838200"/>
         </p:xfrm>
         <a:graphic>
           <a:graphicData uri="http://schemas.openxmlformats.org/presentationml/2006/ole">
             <mc:AlternateContent xmlns:mc="http://schemas.openxmlformats.org/markup-compatibility/2006">
               <mc:Choice xmlns:v="urn:schemas-microsoft-com:vml" Requires="v">
-                <p:oleObj spid="_x0000_s2061" name="Equation" r:id="rId4" imgW="2844800" imgH="495300" progId="Equation.3">
+                <p:oleObj spid="_x0000_s2064" name="Equation" r:id="rId4" imgW="2844800" imgH="495300" progId="Equation.3">
                   <p:embed/>
                 </p:oleObj>
               </mc:Choice>
@@ -10503,8 +8987,8 @@
                     </p:blipFill>
                     <p:spPr>
                       <a:xfrm>
-                        <a:off x="1912938" y="1651000"/>
-                        <a:ext cx="3795712" cy="660400"/>
+                        <a:off x="2116566" y="1676400"/>
+                        <a:ext cx="4817634" cy="838200"/>
                       </a:xfrm>
                       <a:prstGeom prst="rect">
                         <a:avLst/>
@@ -10530,214 +9014,9 @@
   <p:timing>
     <p:tnLst>
       <p:par>
-        <p:cTn xmlns:p14="http://schemas.microsoft.com/office/powerpoint/2010/main" id="1" dur="indefinite" restart="never" nodeType="tmRoot">
-          <p:childTnLst>
-            <p:seq concurrent="1" nextAc="seek">
-              <p:cTn id="2" dur="indefinite" nodeType="mainSeq">
-                <p:childTnLst>
-                  <p:par>
-                    <p:cTn id="3" fill="hold">
-                      <p:stCondLst>
-                        <p:cond delay="indefinite"/>
-                      </p:stCondLst>
-                      <p:childTnLst>
-                        <p:par>
-                          <p:cTn id="4" fill="hold">
-                            <p:stCondLst>
-                              <p:cond delay="0"/>
-                            </p:stCondLst>
-                            <p:childTnLst>
-                              <p:par>
-                                <p:cTn id="5" presetID="3" presetClass="entr" presetSubtype="10" fill="hold" grpId="0" nodeType="clickEffect">
-                                  <p:stCondLst>
-                                    <p:cond delay="0"/>
-                                  </p:stCondLst>
-                                  <p:childTnLst>
-                                    <p:set>
-                                      <p:cBhvr>
-                                        <p:cTn id="6" dur="1" fill="hold">
-                                          <p:stCondLst>
-                                            <p:cond delay="0"/>
-                                          </p:stCondLst>
-                                        </p:cTn>
-                                        <p:tgtEl>
-                                          <p:spTgt spid="6">
-                                            <p:bg/>
-                                          </p:spTgt>
-                                        </p:tgtEl>
-                                        <p:attrNameLst>
-                                          <p:attrName>style.visibility</p:attrName>
-                                        </p:attrNameLst>
-                                      </p:cBhvr>
-                                      <p:to>
-                                        <p:strVal val="visible"/>
-                                      </p:to>
-                                    </p:set>
-                                    <p:animEffect transition="in" filter="blinds(horizontal)">
-                                      <p:cBhvr>
-                                        <p:cTn id="7" dur="500"/>
-                                        <p:tgtEl>
-                                          <p:spTgt spid="6">
-                                            <p:bg/>
-                                          </p:spTgt>
-                                        </p:tgtEl>
-                                      </p:cBhvr>
-                                    </p:animEffect>
-                                  </p:childTnLst>
-                                </p:cTn>
-                              </p:par>
-                            </p:childTnLst>
-                          </p:cTn>
-                        </p:par>
-                      </p:childTnLst>
-                    </p:cTn>
-                  </p:par>
-                  <p:par>
-                    <p:cTn id="8" fill="hold">
-                      <p:stCondLst>
-                        <p:cond delay="indefinite"/>
-                      </p:stCondLst>
-                      <p:childTnLst>
-                        <p:par>
-                          <p:cTn id="9" fill="hold">
-                            <p:stCondLst>
-                              <p:cond delay="0"/>
-                            </p:stCondLst>
-                            <p:childTnLst>
-                              <p:par>
-                                <p:cTn id="10" presetID="3" presetClass="entr" presetSubtype="10" fill="hold" grpId="0" nodeType="clickEffect">
-                                  <p:stCondLst>
-                                    <p:cond delay="0"/>
-                                  </p:stCondLst>
-                                  <p:childTnLst>
-                                    <p:set>
-                                      <p:cBhvr>
-                                        <p:cTn id="11" dur="1" fill="hold">
-                                          <p:stCondLst>
-                                            <p:cond delay="0"/>
-                                          </p:stCondLst>
-                                        </p:cTn>
-                                        <p:tgtEl>
-                                          <p:spTgt spid="6">
-                                            <p:txEl>
-                                              <p:pRg st="1" end="1"/>
-                                            </p:txEl>
-                                          </p:spTgt>
-                                        </p:tgtEl>
-                                        <p:attrNameLst>
-                                          <p:attrName>style.visibility</p:attrName>
-                                        </p:attrNameLst>
-                                      </p:cBhvr>
-                                      <p:to>
-                                        <p:strVal val="visible"/>
-                                      </p:to>
-                                    </p:set>
-                                    <p:animEffect transition="in" filter="blinds(horizontal)">
-                                      <p:cBhvr>
-                                        <p:cTn id="12" dur="500"/>
-                                        <p:tgtEl>
-                                          <p:spTgt spid="6">
-                                            <p:txEl>
-                                              <p:pRg st="1" end="1"/>
-                                            </p:txEl>
-                                          </p:spTgt>
-                                        </p:tgtEl>
-                                      </p:cBhvr>
-                                    </p:animEffect>
-                                  </p:childTnLst>
-                                </p:cTn>
-                              </p:par>
-                            </p:childTnLst>
-                          </p:cTn>
-                        </p:par>
-                      </p:childTnLst>
-                    </p:cTn>
-                  </p:par>
-                  <p:par>
-                    <p:cTn id="13" fill="hold">
-                      <p:stCondLst>
-                        <p:cond delay="indefinite"/>
-                      </p:stCondLst>
-                      <p:childTnLst>
-                        <p:par>
-                          <p:cTn id="14" fill="hold">
-                            <p:stCondLst>
-                              <p:cond delay="0"/>
-                            </p:stCondLst>
-                            <p:childTnLst>
-                              <p:par>
-                                <p:cTn id="15" presetID="3" presetClass="entr" presetSubtype="10" fill="hold" grpId="0" nodeType="clickEffect">
-                                  <p:stCondLst>
-                                    <p:cond delay="0"/>
-                                  </p:stCondLst>
-                                  <p:childTnLst>
-                                    <p:set>
-                                      <p:cBhvr>
-                                        <p:cTn id="16" dur="1" fill="hold">
-                                          <p:stCondLst>
-                                            <p:cond delay="0"/>
-                                          </p:stCondLst>
-                                        </p:cTn>
-                                        <p:tgtEl>
-                                          <p:spTgt spid="6">
-                                            <p:txEl>
-                                              <p:pRg st="6" end="6"/>
-                                            </p:txEl>
-                                          </p:spTgt>
-                                        </p:tgtEl>
-                                        <p:attrNameLst>
-                                          <p:attrName>style.visibility</p:attrName>
-                                        </p:attrNameLst>
-                                      </p:cBhvr>
-                                      <p:to>
-                                        <p:strVal val="visible"/>
-                                      </p:to>
-                                    </p:set>
-                                    <p:animEffect transition="in" filter="blinds(horizontal)">
-                                      <p:cBhvr>
-                                        <p:cTn id="17" dur="500"/>
-                                        <p:tgtEl>
-                                          <p:spTgt spid="6">
-                                            <p:txEl>
-                                              <p:pRg st="6" end="6"/>
-                                            </p:txEl>
-                                          </p:spTgt>
-                                        </p:tgtEl>
-                                      </p:cBhvr>
-                                    </p:animEffect>
-                                  </p:childTnLst>
-                                </p:cTn>
-                              </p:par>
-                            </p:childTnLst>
-                          </p:cTn>
-                        </p:par>
-                      </p:childTnLst>
-                    </p:cTn>
-                  </p:par>
-                </p:childTnLst>
-              </p:cTn>
-              <p:prevCondLst>
-                <p:cond evt="onPrev" delay="0">
-                  <p:tgtEl>
-                    <p:sldTgt/>
-                  </p:tgtEl>
-                </p:cond>
-              </p:prevCondLst>
-              <p:nextCondLst>
-                <p:cond evt="onNext" delay="0">
-                  <p:tgtEl>
-                    <p:sldTgt/>
-                  </p:tgtEl>
-                </p:cond>
-              </p:nextCondLst>
-            </p:seq>
-          </p:childTnLst>
-        </p:cTn>
+        <p:cTn xmlns:p14="http://schemas.microsoft.com/office/powerpoint/2010/main" id="1" dur="indefinite" restart="never" nodeType="tmRoot"/>
       </p:par>
     </p:tnLst>
-    <p:bldLst>
-      <p:bldP spid="6" grpId="0" build="p" bldLvl="2" animBg="1"/>
-    </p:bldLst>
   </p:timing>
 </p:sld>
 </file>
@@ -11077,25 +9356,25 @@
           <p:nvPr>
             <p:extLst>
               <p:ext uri="{D42A27DB-BD31-4B8C-83A1-F6EECF244321}">
-                <p14:modId xmlns:p14="http://schemas.microsoft.com/office/powerpoint/2010/main" val="360470804"/>
+                <p14:modId xmlns:p14="http://schemas.microsoft.com/office/powerpoint/2010/main" val="2218707460"/>
               </p:ext>
             </p:extLst>
           </p:nvPr>
         </p:nvGraphicFramePr>
         <p:xfrm>
-          <a:off x="2057400" y="1295400"/>
-          <a:ext cx="4489450" cy="508000"/>
+          <a:off x="2530475" y="1066800"/>
+          <a:ext cx="5312570" cy="762000"/>
         </p:xfrm>
         <a:graphic>
           <a:graphicData uri="http://schemas.openxmlformats.org/presentationml/2006/ole">
             <mc:AlternateContent xmlns:mc="http://schemas.openxmlformats.org/markup-compatibility/2006">
               <mc:Choice xmlns:v="urn:schemas-microsoft-com:vml" Requires="v">
-                <p:oleObj spid="_x0000_s1063" name="Equation" r:id="rId4" imgW="3365500" imgH="381000" progId="Equation.3">
+                <p:oleObj spid="_x0000_s1070" name="Equation" r:id="rId4" imgW="2654300" imgH="381000" progId="Equation.3">
                   <p:embed/>
                 </p:oleObj>
               </mc:Choice>
               <mc:Fallback>
-                <p:oleObj name="Equation" r:id="rId4" imgW="3365500" imgH="381000" progId="Equation.3">
+                <p:oleObj name="Equation" r:id="rId4" imgW="2654300" imgH="381000" progId="Equation.3">
                   <p:embed/>
                   <p:pic>
                     <p:nvPicPr>
@@ -11111,8 +9390,8 @@
                     </p:blipFill>
                     <p:spPr>
                       <a:xfrm>
-                        <a:off x="2057400" y="1295400"/>
-                        <a:ext cx="4489450" cy="508000"/>
+                        <a:off x="2530475" y="1066800"/>
+                        <a:ext cx="5312570" cy="762000"/>
                       </a:xfrm>
                       <a:prstGeom prst="rect">
                         <a:avLst/>
@@ -11134,20 +9413,20 @@
           <p:nvPr>
             <p:extLst>
               <p:ext uri="{D42A27DB-BD31-4B8C-83A1-F6EECF244321}">
-                <p14:modId xmlns:p14="http://schemas.microsoft.com/office/powerpoint/2010/main" val="649787649"/>
+                <p14:modId xmlns:p14="http://schemas.microsoft.com/office/powerpoint/2010/main" val="2100837061"/>
               </p:ext>
             </p:extLst>
           </p:nvPr>
         </p:nvGraphicFramePr>
         <p:xfrm>
-          <a:off x="2547938" y="2651125"/>
-          <a:ext cx="3049587" cy="541338"/>
+          <a:off x="2547938" y="2651124"/>
+          <a:ext cx="4382100" cy="777875"/>
         </p:xfrm>
         <a:graphic>
           <a:graphicData uri="http://schemas.openxmlformats.org/presentationml/2006/ole">
             <mc:AlternateContent xmlns:mc="http://schemas.openxmlformats.org/markup-compatibility/2006">
               <mc:Choice xmlns:v="urn:schemas-microsoft-com:vml" Requires="v">
-                <p:oleObj spid="_x0000_s1064" name="Equation" r:id="rId6" imgW="2286000" imgH="406400" progId="Equation.3">
+                <p:oleObj spid="_x0000_s1071" name="Equation" r:id="rId6" imgW="2286000" imgH="406400" progId="Equation.3">
                   <p:embed/>
                 </p:oleObj>
               </mc:Choice>
@@ -11168,8 +9447,8 @@
                     </p:blipFill>
                     <p:spPr>
                       <a:xfrm>
-                        <a:off x="2547938" y="2651125"/>
-                        <a:ext cx="3049587" cy="541338"/>
+                        <a:off x="2547938" y="2651124"/>
+                        <a:ext cx="4382100" cy="777875"/>
                       </a:xfrm>
                       <a:prstGeom prst="rect">
                         <a:avLst/>
@@ -11191,20 +9470,20 @@
           <p:nvPr>
             <p:extLst>
               <p:ext uri="{D42A27DB-BD31-4B8C-83A1-F6EECF244321}">
-                <p14:modId xmlns:p14="http://schemas.microsoft.com/office/powerpoint/2010/main" val="1679667364"/>
+                <p14:modId xmlns:p14="http://schemas.microsoft.com/office/powerpoint/2010/main" val="173386898"/>
               </p:ext>
             </p:extLst>
           </p:nvPr>
         </p:nvGraphicFramePr>
         <p:xfrm>
-          <a:off x="2166938" y="3962400"/>
-          <a:ext cx="5453062" cy="1387475"/>
+          <a:off x="1371600" y="3962400"/>
+          <a:ext cx="7187560" cy="1828800"/>
         </p:xfrm>
         <a:graphic>
           <a:graphicData uri="http://schemas.openxmlformats.org/presentationml/2006/ole">
             <mc:AlternateContent xmlns:mc="http://schemas.openxmlformats.org/markup-compatibility/2006">
               <mc:Choice xmlns:v="urn:schemas-microsoft-com:vml" Requires="v">
-                <p:oleObj spid="_x0000_s1065" name="Equation" r:id="rId8" imgW="4089400" imgH="1041400" progId="Equation.3">
+                <p:oleObj spid="_x0000_s1072" name="Equation" r:id="rId8" imgW="4089400" imgH="1041400" progId="Equation.3">
                   <p:embed/>
                 </p:oleObj>
               </mc:Choice>
@@ -11225,8 +9504,8 @@
                     </p:blipFill>
                     <p:spPr>
                       <a:xfrm>
-                        <a:off x="2166938" y="3962400"/>
-                        <a:ext cx="5453062" cy="1387475"/>
+                        <a:off x="1371600" y="3962400"/>
+                        <a:ext cx="7187560" cy="1828800"/>
                       </a:xfrm>
                       <a:prstGeom prst="rect">
                         <a:avLst/>
@@ -11252,336 +9531,9 @@
   <p:timing>
     <p:tnLst>
       <p:par>
-        <p:cTn xmlns:p14="http://schemas.microsoft.com/office/powerpoint/2010/main" id="1" dur="indefinite" restart="never" nodeType="tmRoot">
-          <p:childTnLst>
-            <p:seq concurrent="1" nextAc="seek">
-              <p:cTn id="2" dur="indefinite" nodeType="mainSeq">
-                <p:childTnLst>
-                  <p:par>
-                    <p:cTn id="3" fill="hold">
-                      <p:stCondLst>
-                        <p:cond delay="indefinite"/>
-                      </p:stCondLst>
-                      <p:childTnLst>
-                        <p:par>
-                          <p:cTn id="4" fill="hold">
-                            <p:stCondLst>
-                              <p:cond delay="0"/>
-                            </p:stCondLst>
-                            <p:childTnLst>
-                              <p:par>
-                                <p:cTn id="5" presetID="3" presetClass="entr" presetSubtype="10" fill="hold" grpId="0" nodeType="clickEffect">
-                                  <p:stCondLst>
-                                    <p:cond delay="0"/>
-                                  </p:stCondLst>
-                                  <p:childTnLst>
-                                    <p:set>
-                                      <p:cBhvr>
-                                        <p:cTn id="6" dur="1" fill="hold">
-                                          <p:stCondLst>
-                                            <p:cond delay="0"/>
-                                          </p:stCondLst>
-                                        </p:cTn>
-                                        <p:tgtEl>
-                                          <p:spTgt spid="6">
-                                            <p:bg/>
-                                          </p:spTgt>
-                                        </p:tgtEl>
-                                        <p:attrNameLst>
-                                          <p:attrName>style.visibility</p:attrName>
-                                        </p:attrNameLst>
-                                      </p:cBhvr>
-                                      <p:to>
-                                        <p:strVal val="visible"/>
-                                      </p:to>
-                                    </p:set>
-                                    <p:animEffect transition="in" filter="blinds(horizontal)">
-                                      <p:cBhvr>
-                                        <p:cTn id="7" dur="500"/>
-                                        <p:tgtEl>
-                                          <p:spTgt spid="6">
-                                            <p:bg/>
-                                          </p:spTgt>
-                                        </p:tgtEl>
-                                      </p:cBhvr>
-                                    </p:animEffect>
-                                  </p:childTnLst>
-                                </p:cTn>
-                              </p:par>
-                            </p:childTnLst>
-                          </p:cTn>
-                        </p:par>
-                      </p:childTnLst>
-                    </p:cTn>
-                  </p:par>
-                  <p:par>
-                    <p:cTn id="8" fill="hold">
-                      <p:stCondLst>
-                        <p:cond delay="indefinite"/>
-                      </p:stCondLst>
-                      <p:childTnLst>
-                        <p:par>
-                          <p:cTn id="9" fill="hold">
-                            <p:stCondLst>
-                              <p:cond delay="0"/>
-                            </p:stCondLst>
-                            <p:childTnLst>
-                              <p:par>
-                                <p:cTn id="10" presetID="3" presetClass="entr" presetSubtype="10" fill="hold" grpId="0" nodeType="clickEffect">
-                                  <p:stCondLst>
-                                    <p:cond delay="0"/>
-                                  </p:stCondLst>
-                                  <p:childTnLst>
-                                    <p:set>
-                                      <p:cBhvr>
-                                        <p:cTn id="11" dur="1" fill="hold">
-                                          <p:stCondLst>
-                                            <p:cond delay="0"/>
-                                          </p:stCondLst>
-                                        </p:cTn>
-                                        <p:tgtEl>
-                                          <p:spTgt spid="6">
-                                            <p:txEl>
-                                              <p:pRg st="1" end="1"/>
-                                            </p:txEl>
-                                          </p:spTgt>
-                                        </p:tgtEl>
-                                        <p:attrNameLst>
-                                          <p:attrName>style.visibility</p:attrName>
-                                        </p:attrNameLst>
-                                      </p:cBhvr>
-                                      <p:to>
-                                        <p:strVal val="visible"/>
-                                      </p:to>
-                                    </p:set>
-                                    <p:animEffect transition="in" filter="blinds(horizontal)">
-                                      <p:cBhvr>
-                                        <p:cTn id="12" dur="500"/>
-                                        <p:tgtEl>
-                                          <p:spTgt spid="6">
-                                            <p:txEl>
-                                              <p:pRg st="1" end="1"/>
-                                            </p:txEl>
-                                          </p:spTgt>
-                                        </p:tgtEl>
-                                      </p:cBhvr>
-                                    </p:animEffect>
-                                  </p:childTnLst>
-                                </p:cTn>
-                              </p:par>
-                            </p:childTnLst>
-                          </p:cTn>
-                        </p:par>
-                      </p:childTnLst>
-                    </p:cTn>
-                  </p:par>
-                  <p:par>
-                    <p:cTn id="13" fill="hold">
-                      <p:stCondLst>
-                        <p:cond delay="indefinite"/>
-                      </p:stCondLst>
-                      <p:childTnLst>
-                        <p:par>
-                          <p:cTn id="14" fill="hold">
-                            <p:stCondLst>
-                              <p:cond delay="0"/>
-                            </p:stCondLst>
-                            <p:childTnLst>
-                              <p:par>
-                                <p:cTn id="15" presetID="3" presetClass="entr" presetSubtype="10" fill="hold" grpId="0" nodeType="clickEffect">
-                                  <p:stCondLst>
-                                    <p:cond delay="0"/>
-                                  </p:stCondLst>
-                                  <p:childTnLst>
-                                    <p:set>
-                                      <p:cBhvr>
-                                        <p:cTn id="16" dur="1" fill="hold">
-                                          <p:stCondLst>
-                                            <p:cond delay="0"/>
-                                          </p:stCondLst>
-                                        </p:cTn>
-                                        <p:tgtEl>
-                                          <p:spTgt spid="6">
-                                            <p:txEl>
-                                              <p:pRg st="5" end="5"/>
-                                            </p:txEl>
-                                          </p:spTgt>
-                                        </p:tgtEl>
-                                        <p:attrNameLst>
-                                          <p:attrName>style.visibility</p:attrName>
-                                        </p:attrNameLst>
-                                      </p:cBhvr>
-                                      <p:to>
-                                        <p:strVal val="visible"/>
-                                      </p:to>
-                                    </p:set>
-                                    <p:animEffect transition="in" filter="blinds(horizontal)">
-                                      <p:cBhvr>
-                                        <p:cTn id="17" dur="500"/>
-                                        <p:tgtEl>
-                                          <p:spTgt spid="6">
-                                            <p:txEl>
-                                              <p:pRg st="5" end="5"/>
-                                            </p:txEl>
-                                          </p:spTgt>
-                                        </p:tgtEl>
-                                      </p:cBhvr>
-                                    </p:animEffect>
-                                  </p:childTnLst>
-                                </p:cTn>
-                              </p:par>
-                            </p:childTnLst>
-                          </p:cTn>
-                        </p:par>
-                      </p:childTnLst>
-                    </p:cTn>
-                  </p:par>
-                  <p:par>
-                    <p:cTn id="18" fill="hold">
-                      <p:stCondLst>
-                        <p:cond delay="indefinite"/>
-                      </p:stCondLst>
-                      <p:childTnLst>
-                        <p:par>
-                          <p:cTn id="19" fill="hold">
-                            <p:stCondLst>
-                              <p:cond delay="0"/>
-                            </p:stCondLst>
-                            <p:childTnLst>
-                              <p:par>
-                                <p:cTn id="20" presetID="3" presetClass="entr" presetSubtype="10" fill="hold" grpId="0" nodeType="clickEffect">
-                                  <p:stCondLst>
-                                    <p:cond delay="0"/>
-                                  </p:stCondLst>
-                                  <p:childTnLst>
-                                    <p:set>
-                                      <p:cBhvr>
-                                        <p:cTn id="21" dur="1" fill="hold">
-                                          <p:stCondLst>
-                                            <p:cond delay="0"/>
-                                          </p:stCondLst>
-                                        </p:cTn>
-                                        <p:tgtEl>
-                                          <p:spTgt spid="6">
-                                            <p:txEl>
-                                              <p:pRg st="10" end="10"/>
-                                            </p:txEl>
-                                          </p:spTgt>
-                                        </p:tgtEl>
-                                        <p:attrNameLst>
-                                          <p:attrName>style.visibility</p:attrName>
-                                        </p:attrNameLst>
-                                      </p:cBhvr>
-                                      <p:to>
-                                        <p:strVal val="visible"/>
-                                      </p:to>
-                                    </p:set>
-                                    <p:animEffect transition="in" filter="blinds(horizontal)">
-                                      <p:cBhvr>
-                                        <p:cTn id="22" dur="500"/>
-                                        <p:tgtEl>
-                                          <p:spTgt spid="6">
-                                            <p:txEl>
-                                              <p:pRg st="10" end="10"/>
-                                            </p:txEl>
-                                          </p:spTgt>
-                                        </p:tgtEl>
-                                      </p:cBhvr>
-                                    </p:animEffect>
-                                  </p:childTnLst>
-                                </p:cTn>
-                              </p:par>
-                            </p:childTnLst>
-                          </p:cTn>
-                        </p:par>
-                      </p:childTnLst>
-                    </p:cTn>
-                  </p:par>
-                  <p:par>
-                    <p:cTn id="23" fill="hold">
-                      <p:stCondLst>
-                        <p:cond delay="indefinite"/>
-                      </p:stCondLst>
-                      <p:childTnLst>
-                        <p:par>
-                          <p:cTn id="24" fill="hold">
-                            <p:stCondLst>
-                              <p:cond delay="0"/>
-                            </p:stCondLst>
-                            <p:childTnLst>
-                              <p:par>
-                                <p:cTn id="25" presetID="3" presetClass="entr" presetSubtype="10" fill="hold" grpId="0" nodeType="clickEffect">
-                                  <p:stCondLst>
-                                    <p:cond delay="0"/>
-                                  </p:stCondLst>
-                                  <p:childTnLst>
-                                    <p:set>
-                                      <p:cBhvr>
-                                        <p:cTn id="26" dur="1" fill="hold">
-                                          <p:stCondLst>
-                                            <p:cond delay="0"/>
-                                          </p:stCondLst>
-                                        </p:cTn>
-                                        <p:tgtEl>
-                                          <p:spTgt spid="6">
-                                            <p:txEl>
-                                              <p:pRg st="18" end="18"/>
-                                            </p:txEl>
-                                          </p:spTgt>
-                                        </p:tgtEl>
-                                        <p:attrNameLst>
-                                          <p:attrName>style.visibility</p:attrName>
-                                        </p:attrNameLst>
-                                      </p:cBhvr>
-                                      <p:to>
-                                        <p:strVal val="visible"/>
-                                      </p:to>
-                                    </p:set>
-                                    <p:animEffect transition="in" filter="blinds(horizontal)">
-                                      <p:cBhvr>
-                                        <p:cTn id="27" dur="500"/>
-                                        <p:tgtEl>
-                                          <p:spTgt spid="6">
-                                            <p:txEl>
-                                              <p:pRg st="18" end="18"/>
-                                            </p:txEl>
-                                          </p:spTgt>
-                                        </p:tgtEl>
-                                      </p:cBhvr>
-                                    </p:animEffect>
-                                  </p:childTnLst>
-                                </p:cTn>
-                              </p:par>
-                            </p:childTnLst>
-                          </p:cTn>
-                        </p:par>
-                      </p:childTnLst>
-                    </p:cTn>
-                  </p:par>
-                </p:childTnLst>
-              </p:cTn>
-              <p:prevCondLst>
-                <p:cond evt="onPrev" delay="0">
-                  <p:tgtEl>
-                    <p:sldTgt/>
-                  </p:tgtEl>
-                </p:cond>
-              </p:prevCondLst>
-              <p:nextCondLst>
-                <p:cond evt="onNext" delay="0">
-                  <p:tgtEl>
-                    <p:sldTgt/>
-                  </p:tgtEl>
-                </p:cond>
-              </p:nextCondLst>
-            </p:seq>
-          </p:childTnLst>
-        </p:cTn>
+        <p:cTn xmlns:p14="http://schemas.microsoft.com/office/powerpoint/2010/main" id="1" dur="indefinite" restart="never" nodeType="tmRoot"/>
       </p:par>
     </p:tnLst>
-    <p:bldLst>
-      <p:bldP spid="6" grpId="0" build="p" bldLvl="2" animBg="1"/>
-    </p:bldLst>
   </p:timing>
 </p:sld>
 </file>
@@ -11615,27 +9567,27 @@
         </p:nvSpPr>
         <p:spPr>
           <a:xfrm>
-            <a:off x="609600" y="76201"/>
-            <a:ext cx="7772400" cy="762000"/>
+            <a:off x="0" y="-76200"/>
+            <a:ext cx="8991600" cy="762000"/>
           </a:xfrm>
         </p:spPr>
         <p:txBody>
           <a:bodyPr>
-            <a:normAutofit fontScale="90000"/>
+            <a:noAutofit/>
           </a:bodyPr>
           <a:lstStyle/>
           <a:p>
             <a:r>
-              <a:rPr lang="en-US" sz="3200" dirty="0" smtClean="0">
+              <a:rPr lang="en-US" sz="2400" dirty="0" smtClean="0">
                 <a:solidFill>
                   <a:schemeClr val="accent2">
                     <a:lumMod val="75000"/>
                   </a:schemeClr>
                 </a:solidFill>
               </a:rPr>
-              <a:t>Bayesian Inference (conditional on the variance)</a:t>
-            </a:r>
-            <a:endParaRPr lang="en-US" sz="3200" dirty="0">
+              <a:t>Steps required to drive the posterior distribution of the mean</a:t>
+            </a:r>
+            <a:endParaRPr lang="en-US" sz="2400" dirty="0">
               <a:solidFill>
                 <a:schemeClr val="accent2">
                   <a:lumMod val="75000"/>
@@ -11684,8 +9636,8 @@
         </p:nvSpPr>
         <p:spPr>
           <a:xfrm>
-            <a:off x="457200" y="762000"/>
-            <a:ext cx="8229600" cy="5632312"/>
+            <a:off x="76200" y="762000"/>
+            <a:ext cx="8915400" cy="5632312"/>
           </a:xfrm>
           <a:prstGeom prst="rect">
             <a:avLst/>
@@ -11947,25 +9899,25 @@
           <p:nvPr>
             <p:extLst>
               <p:ext uri="{D42A27DB-BD31-4B8C-83A1-F6EECF244321}">
-                <p14:modId xmlns:p14="http://schemas.microsoft.com/office/powerpoint/2010/main" val="2308192689"/>
+                <p14:modId xmlns:p14="http://schemas.microsoft.com/office/powerpoint/2010/main" val="3545575036"/>
               </p:ext>
             </p:extLst>
           </p:nvPr>
         </p:nvGraphicFramePr>
         <p:xfrm>
-          <a:off x="642938" y="1219200"/>
-          <a:ext cx="7891462" cy="3179762"/>
+          <a:off x="304800" y="1152524"/>
+          <a:ext cx="8322401" cy="3571875"/>
         </p:xfrm>
         <a:graphic>
           <a:graphicData uri="http://schemas.openxmlformats.org/presentationml/2006/ole">
             <mc:AlternateContent xmlns:mc="http://schemas.openxmlformats.org/markup-compatibility/2006">
               <mc:Choice xmlns:v="urn:schemas-microsoft-com:vml" Requires="v">
-                <p:oleObj spid="_x0000_s4139" name="Equation" r:id="rId4" imgW="5918200" imgH="2387600" progId="Equation.3">
+                <p:oleObj spid="_x0000_s4148" name="Equation" r:id="rId4" imgW="5791200" imgH="2489200" progId="Equation.3">
                   <p:embed/>
                 </p:oleObj>
               </mc:Choice>
               <mc:Fallback>
-                <p:oleObj name="Equation" r:id="rId4" imgW="5918200" imgH="2387600" progId="Equation.3">
+                <p:oleObj name="Equation" r:id="rId4" imgW="5791200" imgH="2489200" progId="Equation.3">
                   <p:embed/>
                   <p:pic>
                     <p:nvPicPr>
@@ -11981,8 +9933,8 @@
                     </p:blipFill>
                     <p:spPr>
                       <a:xfrm>
-                        <a:off x="642938" y="1219200"/>
-                        <a:ext cx="7891462" cy="3179762"/>
+                        <a:off x="304800" y="1152524"/>
+                        <a:ext cx="8322401" cy="3571875"/>
                       </a:xfrm>
                       <a:prstGeom prst="rect">
                         <a:avLst/>
@@ -12004,20 +9956,20 @@
           <p:nvPr>
             <p:extLst>
               <p:ext uri="{D42A27DB-BD31-4B8C-83A1-F6EECF244321}">
-                <p14:modId xmlns:p14="http://schemas.microsoft.com/office/powerpoint/2010/main" val="2204771842"/>
+                <p14:modId xmlns:p14="http://schemas.microsoft.com/office/powerpoint/2010/main" val="1889549393"/>
               </p:ext>
             </p:extLst>
           </p:nvPr>
         </p:nvGraphicFramePr>
         <p:xfrm>
-          <a:off x="1358900" y="4864100"/>
+          <a:off x="838200" y="4876800"/>
           <a:ext cx="800570" cy="469900"/>
         </p:xfrm>
         <a:graphic>
           <a:graphicData uri="http://schemas.openxmlformats.org/presentationml/2006/ole">
             <mc:AlternateContent xmlns:mc="http://schemas.openxmlformats.org/markup-compatibility/2006">
               <mc:Choice xmlns:v="urn:schemas-microsoft-com:vml" Requires="v">
-                <p:oleObj spid="_x0000_s4140" name="Equation" r:id="rId6" imgW="584200" imgH="342900" progId="Equation.3">
+                <p:oleObj spid="_x0000_s4149" name="Equation" r:id="rId6" imgW="584200" imgH="342900" progId="Equation.3">
                   <p:embed/>
                 </p:oleObj>
               </mc:Choice>
@@ -12038,7 +9990,7 @@
                     </p:blipFill>
                     <p:spPr>
                       <a:xfrm>
-                        <a:off x="1358900" y="4864100"/>
+                        <a:off x="838200" y="4876800"/>
                         <a:ext cx="800570" cy="469900"/>
                       </a:xfrm>
                       <a:prstGeom prst="rect">
@@ -12061,20 +10013,20 @@
           <p:nvPr>
             <p:extLst>
               <p:ext uri="{D42A27DB-BD31-4B8C-83A1-F6EECF244321}">
-                <p14:modId xmlns:p14="http://schemas.microsoft.com/office/powerpoint/2010/main" val="1405486571"/>
+                <p14:modId xmlns:p14="http://schemas.microsoft.com/office/powerpoint/2010/main" val="735802587"/>
               </p:ext>
             </p:extLst>
           </p:nvPr>
         </p:nvGraphicFramePr>
         <p:xfrm>
-          <a:off x="2438400" y="4800600"/>
+          <a:off x="1905000" y="4876800"/>
           <a:ext cx="1089025" cy="522288"/>
         </p:xfrm>
         <a:graphic>
           <a:graphicData uri="http://schemas.openxmlformats.org/presentationml/2006/ole">
             <mc:AlternateContent xmlns:mc="http://schemas.openxmlformats.org/markup-compatibility/2006">
               <mc:Choice xmlns:v="urn:schemas-microsoft-com:vml" Requires="v">
-                <p:oleObj spid="_x0000_s4141" name="Equation" r:id="rId8" imgW="635000" imgH="304800" progId="Equation.3">
+                <p:oleObj spid="_x0000_s4150" name="Equation" r:id="rId8" imgW="635000" imgH="304800" progId="Equation.3">
                   <p:embed/>
                 </p:oleObj>
               </mc:Choice>
@@ -12095,7 +10047,7 @@
                     </p:blipFill>
                     <p:spPr>
                       <a:xfrm>
-                        <a:off x="2438400" y="4800600"/>
+                        <a:off x="1905000" y="4876800"/>
                         <a:ext cx="1089025" cy="522288"/>
                       </a:xfrm>
                       <a:prstGeom prst="rect">
@@ -12118,20 +10070,20 @@
           <p:nvPr>
             <p:extLst>
               <p:ext uri="{D42A27DB-BD31-4B8C-83A1-F6EECF244321}">
-                <p14:modId xmlns:p14="http://schemas.microsoft.com/office/powerpoint/2010/main" val="1069897911"/>
+                <p14:modId xmlns:p14="http://schemas.microsoft.com/office/powerpoint/2010/main" val="512939684"/>
               </p:ext>
             </p:extLst>
           </p:nvPr>
         </p:nvGraphicFramePr>
         <p:xfrm>
-          <a:off x="2133600" y="5638800"/>
-          <a:ext cx="4351337" cy="541337"/>
+          <a:off x="1143000" y="5562600"/>
+          <a:ext cx="6188853" cy="769937"/>
         </p:xfrm>
         <a:graphic>
           <a:graphicData uri="http://schemas.openxmlformats.org/presentationml/2006/ole">
             <mc:AlternateContent xmlns:mc="http://schemas.openxmlformats.org/markup-compatibility/2006">
               <mc:Choice xmlns:v="urn:schemas-microsoft-com:vml" Requires="v">
-                <p:oleObj spid="_x0000_s4142" name="Equation" r:id="rId10" imgW="3263900" imgH="406400" progId="Equation.3">
+                <p:oleObj spid="_x0000_s4151" name="Equation" r:id="rId10" imgW="3263900" imgH="406400" progId="Equation.3">
                   <p:embed/>
                 </p:oleObj>
               </mc:Choice>
@@ -12152,8 +10104,8 @@
                     </p:blipFill>
                     <p:spPr>
                       <a:xfrm>
-                        <a:off x="2133600" y="5638800"/>
-                        <a:ext cx="4351337" cy="541337"/>
+                        <a:off x="1143000" y="5562600"/>
+                        <a:ext cx="6188853" cy="769937"/>
                       </a:xfrm>
                       <a:prstGeom prst="rect">
                         <a:avLst/>
@@ -12179,214 +10131,9 @@
   <p:timing>
     <p:tnLst>
       <p:par>
-        <p:cTn xmlns:p14="http://schemas.microsoft.com/office/powerpoint/2010/main" id="1" dur="indefinite" restart="never" nodeType="tmRoot">
-          <p:childTnLst>
-            <p:seq concurrent="1" nextAc="seek">
-              <p:cTn id="2" dur="indefinite" nodeType="mainSeq">
-                <p:childTnLst>
-                  <p:par>
-                    <p:cTn id="3" fill="hold">
-                      <p:stCondLst>
-                        <p:cond delay="indefinite"/>
-                      </p:stCondLst>
-                      <p:childTnLst>
-                        <p:par>
-                          <p:cTn id="4" fill="hold">
-                            <p:stCondLst>
-                              <p:cond delay="0"/>
-                            </p:stCondLst>
-                            <p:childTnLst>
-                              <p:par>
-                                <p:cTn id="5" presetID="3" presetClass="entr" presetSubtype="10" fill="hold" grpId="0" nodeType="clickEffect">
-                                  <p:stCondLst>
-                                    <p:cond delay="0"/>
-                                  </p:stCondLst>
-                                  <p:childTnLst>
-                                    <p:set>
-                                      <p:cBhvr>
-                                        <p:cTn id="6" dur="1" fill="hold">
-                                          <p:stCondLst>
-                                            <p:cond delay="0"/>
-                                          </p:stCondLst>
-                                        </p:cTn>
-                                        <p:tgtEl>
-                                          <p:spTgt spid="6">
-                                            <p:bg/>
-                                          </p:spTgt>
-                                        </p:tgtEl>
-                                        <p:attrNameLst>
-                                          <p:attrName>style.visibility</p:attrName>
-                                        </p:attrNameLst>
-                                      </p:cBhvr>
-                                      <p:to>
-                                        <p:strVal val="visible"/>
-                                      </p:to>
-                                    </p:set>
-                                    <p:animEffect transition="in" filter="blinds(horizontal)">
-                                      <p:cBhvr>
-                                        <p:cTn id="7" dur="500"/>
-                                        <p:tgtEl>
-                                          <p:spTgt spid="6">
-                                            <p:bg/>
-                                          </p:spTgt>
-                                        </p:tgtEl>
-                                      </p:cBhvr>
-                                    </p:animEffect>
-                                  </p:childTnLst>
-                                </p:cTn>
-                              </p:par>
-                            </p:childTnLst>
-                          </p:cTn>
-                        </p:par>
-                      </p:childTnLst>
-                    </p:cTn>
-                  </p:par>
-                  <p:par>
-                    <p:cTn id="8" fill="hold">
-                      <p:stCondLst>
-                        <p:cond delay="indefinite"/>
-                      </p:stCondLst>
-                      <p:childTnLst>
-                        <p:par>
-                          <p:cTn id="9" fill="hold">
-                            <p:stCondLst>
-                              <p:cond delay="0"/>
-                            </p:stCondLst>
-                            <p:childTnLst>
-                              <p:par>
-                                <p:cTn id="10" presetID="3" presetClass="entr" presetSubtype="10" fill="hold" grpId="0" nodeType="clickEffect">
-                                  <p:stCondLst>
-                                    <p:cond delay="0"/>
-                                  </p:stCondLst>
-                                  <p:childTnLst>
-                                    <p:set>
-                                      <p:cBhvr>
-                                        <p:cTn id="11" dur="1" fill="hold">
-                                          <p:stCondLst>
-                                            <p:cond delay="0"/>
-                                          </p:stCondLst>
-                                        </p:cTn>
-                                        <p:tgtEl>
-                                          <p:spTgt spid="6">
-                                            <p:txEl>
-                                              <p:pRg st="0" end="0"/>
-                                            </p:txEl>
-                                          </p:spTgt>
-                                        </p:tgtEl>
-                                        <p:attrNameLst>
-                                          <p:attrName>style.visibility</p:attrName>
-                                        </p:attrNameLst>
-                                      </p:cBhvr>
-                                      <p:to>
-                                        <p:strVal val="visible"/>
-                                      </p:to>
-                                    </p:set>
-                                    <p:animEffect transition="in" filter="blinds(horizontal)">
-                                      <p:cBhvr>
-                                        <p:cTn id="12" dur="500"/>
-                                        <p:tgtEl>
-                                          <p:spTgt spid="6">
-                                            <p:txEl>
-                                              <p:pRg st="0" end="0"/>
-                                            </p:txEl>
-                                          </p:spTgt>
-                                        </p:tgtEl>
-                                      </p:cBhvr>
-                                    </p:animEffect>
-                                  </p:childTnLst>
-                                </p:cTn>
-                              </p:par>
-                            </p:childTnLst>
-                          </p:cTn>
-                        </p:par>
-                      </p:childTnLst>
-                    </p:cTn>
-                  </p:par>
-                  <p:par>
-                    <p:cTn id="13" fill="hold">
-                      <p:stCondLst>
-                        <p:cond delay="indefinite"/>
-                      </p:stCondLst>
-                      <p:childTnLst>
-                        <p:par>
-                          <p:cTn id="14" fill="hold">
-                            <p:stCondLst>
-                              <p:cond delay="0"/>
-                            </p:stCondLst>
-                            <p:childTnLst>
-                              <p:par>
-                                <p:cTn id="15" presetID="3" presetClass="entr" presetSubtype="10" fill="hold" grpId="0" nodeType="clickEffect">
-                                  <p:stCondLst>
-                                    <p:cond delay="0"/>
-                                  </p:stCondLst>
-                                  <p:childTnLst>
-                                    <p:set>
-                                      <p:cBhvr>
-                                        <p:cTn id="16" dur="1" fill="hold">
-                                          <p:stCondLst>
-                                            <p:cond delay="0"/>
-                                          </p:stCondLst>
-                                        </p:cTn>
-                                        <p:tgtEl>
-                                          <p:spTgt spid="6">
-                                            <p:txEl>
-                                              <p:pRg st="15" end="15"/>
-                                            </p:txEl>
-                                          </p:spTgt>
-                                        </p:tgtEl>
-                                        <p:attrNameLst>
-                                          <p:attrName>style.visibility</p:attrName>
-                                        </p:attrNameLst>
-                                      </p:cBhvr>
-                                      <p:to>
-                                        <p:strVal val="visible"/>
-                                      </p:to>
-                                    </p:set>
-                                    <p:animEffect transition="in" filter="blinds(horizontal)">
-                                      <p:cBhvr>
-                                        <p:cTn id="17" dur="500"/>
-                                        <p:tgtEl>
-                                          <p:spTgt spid="6">
-                                            <p:txEl>
-                                              <p:pRg st="15" end="15"/>
-                                            </p:txEl>
-                                          </p:spTgt>
-                                        </p:tgtEl>
-                                      </p:cBhvr>
-                                    </p:animEffect>
-                                  </p:childTnLst>
-                                </p:cTn>
-                              </p:par>
-                            </p:childTnLst>
-                          </p:cTn>
-                        </p:par>
-                      </p:childTnLst>
-                    </p:cTn>
-                  </p:par>
-                </p:childTnLst>
-              </p:cTn>
-              <p:prevCondLst>
-                <p:cond evt="onPrev" delay="0">
-                  <p:tgtEl>
-                    <p:sldTgt/>
-                  </p:tgtEl>
-                </p:cond>
-              </p:prevCondLst>
-              <p:nextCondLst>
-                <p:cond evt="onNext" delay="0">
-                  <p:tgtEl>
-                    <p:sldTgt/>
-                  </p:tgtEl>
-                </p:cond>
-              </p:nextCondLst>
-            </p:seq>
-          </p:childTnLst>
-        </p:cTn>
+        <p:cTn xmlns:p14="http://schemas.microsoft.com/office/powerpoint/2010/main" id="1" dur="indefinite" restart="never" nodeType="tmRoot"/>
       </p:par>
     </p:tnLst>
-    <p:bldLst>
-      <p:bldP spid="6" grpId="0" build="p" bldLvl="2" animBg="1"/>
-    </p:bldLst>
   </p:timing>
 </p:sld>
 </file>
@@ -12709,20 +10456,20 @@
           <p:nvPr>
             <p:extLst>
               <p:ext uri="{D42A27DB-BD31-4B8C-83A1-F6EECF244321}">
-                <p14:modId xmlns:p14="http://schemas.microsoft.com/office/powerpoint/2010/main" val="851413192"/>
+                <p14:modId xmlns:p14="http://schemas.microsoft.com/office/powerpoint/2010/main" val="2595617257"/>
               </p:ext>
             </p:extLst>
           </p:nvPr>
         </p:nvGraphicFramePr>
         <p:xfrm>
-          <a:off x="1981200" y="1371600"/>
-          <a:ext cx="4857750" cy="3011488"/>
+          <a:off x="1066800" y="1219200"/>
+          <a:ext cx="7374970" cy="4572000"/>
         </p:xfrm>
         <a:graphic>
           <a:graphicData uri="http://schemas.openxmlformats.org/presentationml/2006/ole">
             <mc:AlternateContent xmlns:mc="http://schemas.openxmlformats.org/markup-compatibility/2006">
               <mc:Choice xmlns:v="urn:schemas-microsoft-com:vml" Requires="v">
-                <p:oleObj spid="_x0000_s5134" name="Equation" r:id="rId4" imgW="3644900" imgH="2260600" progId="Equation.3">
+                <p:oleObj spid="_x0000_s5137" name="Equation" r:id="rId4" imgW="3644900" imgH="2260600" progId="Equation.3">
                   <p:embed/>
                 </p:oleObj>
               </mc:Choice>
@@ -12743,8 +10490,8 @@
                     </p:blipFill>
                     <p:spPr>
                       <a:xfrm>
-                        <a:off x="1981200" y="1371600"/>
-                        <a:ext cx="4857750" cy="3011488"/>
+                        <a:off x="1066800" y="1219200"/>
+                        <a:ext cx="7374970" cy="4572000"/>
                       </a:xfrm>
                       <a:prstGeom prst="rect">
                         <a:avLst/>
@@ -13057,8 +10804,25 @@
                   </a:schemeClr>
                 </a:solidFill>
               </a:rPr>
-              <a:t>  =&gt; In this case the MLE is un-biased</a:t>
-            </a:r>
+              <a:t>  =&gt; In this case the MLE is </a:t>
+            </a:r>
+            <a:r>
+              <a:rPr lang="en-US" dirty="0" smtClean="0">
+                <a:solidFill>
+                  <a:schemeClr val="accent1">
+                    <a:lumMod val="75000"/>
+                  </a:schemeClr>
+                </a:solidFill>
+              </a:rPr>
+              <a:t>unbiased</a:t>
+            </a:r>
+            <a:endParaRPr lang="en-US" dirty="0" smtClean="0">
+              <a:solidFill>
+                <a:schemeClr val="accent1">
+                  <a:lumMod val="75000"/>
+                </a:schemeClr>
+              </a:solidFill>
+            </a:endParaRPr>
           </a:p>
           <a:p>
             <a:pPr algn="just"/>
@@ -13266,20 +11030,20 @@
           <p:nvPr>
             <p:extLst>
               <p:ext uri="{D42A27DB-BD31-4B8C-83A1-F6EECF244321}">
-                <p14:modId xmlns:p14="http://schemas.microsoft.com/office/powerpoint/2010/main" val="2640471137"/>
+                <p14:modId xmlns:p14="http://schemas.microsoft.com/office/powerpoint/2010/main" val="4084742615"/>
               </p:ext>
             </p:extLst>
           </p:nvPr>
         </p:nvGraphicFramePr>
         <p:xfrm>
-          <a:off x="1349375" y="1687513"/>
-          <a:ext cx="981075" cy="347662"/>
+          <a:off x="1752600" y="1447800"/>
+          <a:ext cx="1657526" cy="587375"/>
         </p:xfrm>
         <a:graphic>
           <a:graphicData uri="http://schemas.openxmlformats.org/presentationml/2006/ole">
             <mc:AlternateContent xmlns:mc="http://schemas.openxmlformats.org/markup-compatibility/2006">
               <mc:Choice xmlns:v="urn:schemas-microsoft-com:vml" Requires="v">
-                <p:oleObj spid="_x0000_s6163" name="Equation" r:id="rId4" imgW="571500" imgH="203200" progId="Equation.3">
+                <p:oleObj spid="_x0000_s6168" name="Equation" r:id="rId4" imgW="571500" imgH="203200" progId="Equation.3">
                   <p:embed/>
                 </p:oleObj>
               </mc:Choice>
@@ -13300,8 +11064,8 @@
                     </p:blipFill>
                     <p:spPr>
                       <a:xfrm>
-                        <a:off x="1349375" y="1687513"/>
-                        <a:ext cx="981075" cy="347662"/>
+                        <a:off x="1752600" y="1447800"/>
+                        <a:ext cx="1657526" cy="587375"/>
                       </a:xfrm>
                       <a:prstGeom prst="rect">
                         <a:avLst/>
@@ -13323,20 +11087,20 @@
           <p:nvPr>
             <p:extLst>
               <p:ext uri="{D42A27DB-BD31-4B8C-83A1-F6EECF244321}">
-                <p14:modId xmlns:p14="http://schemas.microsoft.com/office/powerpoint/2010/main" val="1683800548"/>
+                <p14:modId xmlns:p14="http://schemas.microsoft.com/office/powerpoint/2010/main" val="628543108"/>
               </p:ext>
             </p:extLst>
           </p:nvPr>
         </p:nvGraphicFramePr>
         <p:xfrm>
-          <a:off x="4867275" y="1339850"/>
-          <a:ext cx="1566863" cy="1044575"/>
+          <a:off x="4419600" y="958850"/>
+          <a:ext cx="2105026" cy="1403350"/>
         </p:xfrm>
         <a:graphic>
           <a:graphicData uri="http://schemas.openxmlformats.org/presentationml/2006/ole">
             <mc:AlternateContent xmlns:mc="http://schemas.openxmlformats.org/markup-compatibility/2006">
               <mc:Choice xmlns:v="urn:schemas-microsoft-com:vml" Requires="v">
-                <p:oleObj spid="_x0000_s6164" name="Equation" r:id="rId6" imgW="914400" imgH="609600" progId="Equation.3">
+                <p:oleObj spid="_x0000_s6169" name="Equation" r:id="rId6" imgW="914400" imgH="609600" progId="Equation.3">
                   <p:embed/>
                 </p:oleObj>
               </mc:Choice>
@@ -13357,8 +11121,8 @@
                     </p:blipFill>
                     <p:spPr>
                       <a:xfrm>
-                        <a:off x="4867275" y="1339850"/>
-                        <a:ext cx="1566863" cy="1044575"/>
+                        <a:off x="4419600" y="958850"/>
+                        <a:ext cx="2105026" cy="1403350"/>
                       </a:xfrm>
                       <a:prstGeom prst="rect">
                         <a:avLst/>
@@ -13573,7 +11337,7 @@
         <p:spPr>
           <a:xfrm>
             <a:off x="457200" y="762000"/>
-            <a:ext cx="8229600" cy="4801315"/>
+            <a:ext cx="8229600" cy="4247317"/>
           </a:xfrm>
           <a:prstGeom prst="rect">
             <a:avLst/>
@@ -13592,25 +11356,16 @@
           </a:bodyPr>
           <a:lstStyle/>
           <a:p>
-            <a:pPr algn="ctr"/>
-            <a:endParaRPr lang="en-US" dirty="0" smtClean="0">
-              <a:solidFill>
-                <a:schemeClr val="accent1">
-                  <a:lumMod val="75000"/>
-                </a:schemeClr>
-              </a:solidFill>
-            </a:endParaRPr>
-          </a:p>
-          <a:p>
-            <a:endParaRPr lang="en-US" dirty="0" smtClean="0">
-              <a:solidFill>
-                <a:schemeClr val="accent1">
-                  <a:lumMod val="75000"/>
-                </a:schemeClr>
-              </a:solidFill>
-            </a:endParaRPr>
-          </a:p>
-          <a:p>
+            <a:r>
+              <a:rPr lang="en-US" dirty="0">
+                <a:solidFill>
+                  <a:schemeClr val="accent1">
+                    <a:lumMod val="75000"/>
+                  </a:schemeClr>
+                </a:solidFill>
+              </a:rPr>
+              <a:t>-</a:t>
+            </a:r>
             <a:r>
               <a:rPr lang="en-US" dirty="0" smtClean="0">
                 <a:solidFill>
@@ -13619,7 +11374,17 @@
                   </a:schemeClr>
                 </a:solidFill>
               </a:rPr>
-              <a:t>- Likelihood (viewed as a function of the variance, for fixed mean)</a:t>
+              <a:t> </a:t>
+            </a:r>
+            <a:r>
+              <a:rPr lang="en-US" dirty="0" smtClean="0">
+                <a:solidFill>
+                  <a:schemeClr val="accent1">
+                    <a:lumMod val="75000"/>
+                  </a:schemeClr>
+                </a:solidFill>
+              </a:rPr>
+              <a:t>Likelihood (viewed as a function of the variance, for fixed mean)</a:t>
             </a:r>
           </a:p>
           <a:p>
@@ -13773,20 +11538,20 @@
           <p:nvPr>
             <p:extLst>
               <p:ext uri="{D42A27DB-BD31-4B8C-83A1-F6EECF244321}">
-                <p14:modId xmlns:p14="http://schemas.microsoft.com/office/powerpoint/2010/main" val="2119684626"/>
+                <p14:modId xmlns:p14="http://schemas.microsoft.com/office/powerpoint/2010/main" val="2484256589"/>
               </p:ext>
             </p:extLst>
           </p:nvPr>
         </p:nvGraphicFramePr>
         <p:xfrm>
-          <a:off x="2133600" y="1897063"/>
-          <a:ext cx="3556000" cy="1049337"/>
+          <a:off x="1659567" y="1295400"/>
+          <a:ext cx="4131633" cy="1219200"/>
         </p:xfrm>
         <a:graphic>
           <a:graphicData uri="http://schemas.openxmlformats.org/presentationml/2006/ole">
             <mc:AlternateContent xmlns:mc="http://schemas.openxmlformats.org/markup-compatibility/2006">
               <mc:Choice xmlns:v="urn:schemas-microsoft-com:vml" Requires="v">
-                <p:oleObj spid="_x0000_s7186" name="Equation" r:id="rId4" imgW="2667000" imgH="787400" progId="Equation.3">
+                <p:oleObj spid="_x0000_s7191" name="Equation" r:id="rId4" imgW="2667000" imgH="787400" progId="Equation.3">
                   <p:embed/>
                 </p:oleObj>
               </mc:Choice>
@@ -13807,8 +11572,8 @@
                     </p:blipFill>
                     <p:spPr>
                       <a:xfrm>
-                        <a:off x="2133600" y="1897063"/>
-                        <a:ext cx="3556000" cy="1049337"/>
+                        <a:off x="1659567" y="1295400"/>
+                        <a:ext cx="4131633" cy="1219200"/>
                       </a:xfrm>
                       <a:prstGeom prst="rect">
                         <a:avLst/>
@@ -13830,20 +11595,20 @@
           <p:nvPr>
             <p:extLst>
               <p:ext uri="{D42A27DB-BD31-4B8C-83A1-F6EECF244321}">
-                <p14:modId xmlns:p14="http://schemas.microsoft.com/office/powerpoint/2010/main" val="3655213883"/>
+                <p14:modId xmlns:p14="http://schemas.microsoft.com/office/powerpoint/2010/main" val="2471053999"/>
               </p:ext>
             </p:extLst>
           </p:nvPr>
         </p:nvGraphicFramePr>
         <p:xfrm>
-          <a:off x="1135063" y="4114800"/>
-          <a:ext cx="5980112" cy="728663"/>
+          <a:off x="762000" y="3352800"/>
+          <a:ext cx="7504449" cy="914400"/>
         </p:xfrm>
         <a:graphic>
           <a:graphicData uri="http://schemas.openxmlformats.org/presentationml/2006/ole">
             <mc:AlternateContent xmlns:mc="http://schemas.openxmlformats.org/markup-compatibility/2006">
               <mc:Choice xmlns:v="urn:schemas-microsoft-com:vml" Requires="v">
-                <p:oleObj spid="_x0000_s7187" name="Equation" r:id="rId6" imgW="4483100" imgH="546100" progId="Equation.3">
+                <p:oleObj spid="_x0000_s7192" name="Equation" r:id="rId6" imgW="4483100" imgH="546100" progId="Equation.3">
                   <p:embed/>
                 </p:oleObj>
               </mc:Choice>
@@ -13864,8 +11629,8 @@
                     </p:blipFill>
                     <p:spPr>
                       <a:xfrm>
-                        <a:off x="1135063" y="4114800"/>
-                        <a:ext cx="5980112" cy="728663"/>
+                        <a:off x="762000" y="3352800"/>
+                        <a:ext cx="7504449" cy="914400"/>
                       </a:xfrm>
                       <a:prstGeom prst="rect">
                         <a:avLst/>
@@ -13891,92 +11656,9 @@
   <p:timing>
     <p:tnLst>
       <p:par>
-        <p:cTn xmlns:p14="http://schemas.microsoft.com/office/powerpoint/2010/main" id="1" dur="indefinite" restart="never" nodeType="tmRoot">
-          <p:childTnLst>
-            <p:seq concurrent="1" nextAc="seek">
-              <p:cTn id="2" dur="indefinite" nodeType="mainSeq">
-                <p:childTnLst>
-                  <p:par>
-                    <p:cTn id="3" fill="hold">
-                      <p:stCondLst>
-                        <p:cond delay="indefinite"/>
-                      </p:stCondLst>
-                      <p:childTnLst>
-                        <p:par>
-                          <p:cTn id="4" fill="hold">
-                            <p:stCondLst>
-                              <p:cond delay="0"/>
-                            </p:stCondLst>
-                            <p:childTnLst>
-                              <p:par>
-                                <p:cTn id="5" presetID="3" presetClass="entr" presetSubtype="10" fill="hold" grpId="0" nodeType="clickEffect">
-                                  <p:stCondLst>
-                                    <p:cond delay="0"/>
-                                  </p:stCondLst>
-                                  <p:childTnLst>
-                                    <p:set>
-                                      <p:cBhvr>
-                                        <p:cTn id="6" dur="1" fill="hold">
-                                          <p:stCondLst>
-                                            <p:cond delay="0"/>
-                                          </p:stCondLst>
-                                        </p:cTn>
-                                        <p:tgtEl>
-                                          <p:spTgt spid="6">
-                                            <p:bg/>
-                                          </p:spTgt>
-                                        </p:tgtEl>
-                                        <p:attrNameLst>
-                                          <p:attrName>style.visibility</p:attrName>
-                                        </p:attrNameLst>
-                                      </p:cBhvr>
-                                      <p:to>
-                                        <p:strVal val="visible"/>
-                                      </p:to>
-                                    </p:set>
-                                    <p:animEffect transition="in" filter="blinds(horizontal)">
-                                      <p:cBhvr>
-                                        <p:cTn id="7" dur="500"/>
-                                        <p:tgtEl>
-                                          <p:spTgt spid="6">
-                                            <p:bg/>
-                                          </p:spTgt>
-                                        </p:tgtEl>
-                                      </p:cBhvr>
-                                    </p:animEffect>
-                                  </p:childTnLst>
-                                </p:cTn>
-                              </p:par>
-                            </p:childTnLst>
-                          </p:cTn>
-                        </p:par>
-                      </p:childTnLst>
-                    </p:cTn>
-                  </p:par>
-                </p:childTnLst>
-              </p:cTn>
-              <p:prevCondLst>
-                <p:cond evt="onPrev" delay="0">
-                  <p:tgtEl>
-                    <p:sldTgt/>
-                  </p:tgtEl>
-                </p:cond>
-              </p:prevCondLst>
-              <p:nextCondLst>
-                <p:cond evt="onNext" delay="0">
-                  <p:tgtEl>
-                    <p:sldTgt/>
-                  </p:tgtEl>
-                </p:cond>
-              </p:nextCondLst>
-            </p:seq>
-          </p:childTnLst>
-        </p:cTn>
+        <p:cTn xmlns:p14="http://schemas.microsoft.com/office/powerpoint/2010/main" id="1" dur="indefinite" restart="never" nodeType="tmRoot"/>
       </p:par>
     </p:tnLst>
-    <p:bldLst>
-      <p:bldP spid="6" grpId="0" build="p" bldLvl="2" animBg="1"/>
-    </p:bldLst>
   </p:timing>
 </p:sld>
 </file>

</xml_diff>

<commit_message>
adding slides ch. 6
</commit_message>
<xml_diff>
--- a/STT465_5.pptx
+++ b/STT465_5.pptx
@@ -212,7 +212,7 @@
             <a:fld id="{EC2AD4C0-0FC1-44D9-A720-D776D6428221}" type="datetimeFigureOut">
               <a:rPr lang="en-US" smtClean="0"/>
               <a:pPr/>
-              <a:t>9/30/15</a:t>
+              <a:t>10/5/15</a:t>
             </a:fld>
             <a:endParaRPr lang="en-US"/>
           </a:p>
@@ -1813,7 +1813,7 @@
             <a:fld id="{F9C811E6-0209-4075-80E7-F5953C8ECEE3}" type="datetime1">
               <a:rPr lang="en-US" smtClean="0"/>
               <a:pPr/>
-              <a:t>9/30/15</a:t>
+              <a:t>10/5/15</a:t>
             </a:fld>
             <a:endParaRPr lang="en-US"/>
           </a:p>
@@ -1984,7 +1984,7 @@
             <a:fld id="{648E6BB1-E6D9-4EE7-828F-046F7223761D}" type="datetime1">
               <a:rPr lang="en-US" smtClean="0"/>
               <a:pPr/>
-              <a:t>9/30/15</a:t>
+              <a:t>10/5/15</a:t>
             </a:fld>
             <a:endParaRPr lang="en-US"/>
           </a:p>
@@ -2165,7 +2165,7 @@
             <a:fld id="{B4B9C580-A780-4D76-B2D1-C34F1DA97DF0}" type="datetime1">
               <a:rPr lang="en-US" smtClean="0"/>
               <a:pPr/>
-              <a:t>9/30/15</a:t>
+              <a:t>10/5/15</a:t>
             </a:fld>
             <a:endParaRPr lang="en-US"/>
           </a:p>
@@ -2336,7 +2336,7 @@
             <a:fld id="{EB19DDAF-3255-4785-974C-BB4FAF02D67E}" type="datetime1">
               <a:rPr lang="en-US" smtClean="0"/>
               <a:pPr/>
-              <a:t>9/30/15</a:t>
+              <a:t>10/5/15</a:t>
             </a:fld>
             <a:endParaRPr lang="en-US"/>
           </a:p>
@@ -2583,7 +2583,7 @@
             <a:fld id="{C344AF86-11D1-4E84-BA60-17130236FDAA}" type="datetime1">
               <a:rPr lang="en-US" smtClean="0"/>
               <a:pPr/>
-              <a:t>9/30/15</a:t>
+              <a:t>10/5/15</a:t>
             </a:fld>
             <a:endParaRPr lang="en-US"/>
           </a:p>
@@ -2872,7 +2872,7 @@
             <a:fld id="{A8DD670F-7E07-4783-A6F8-B28127B5AF4A}" type="datetime1">
               <a:rPr lang="en-US" smtClean="0"/>
               <a:pPr/>
-              <a:t>9/30/15</a:t>
+              <a:t>10/5/15</a:t>
             </a:fld>
             <a:endParaRPr lang="en-US"/>
           </a:p>
@@ -3295,7 +3295,7 @@
             <a:fld id="{92676DD9-688F-48EE-8233-B3B78BDDA63D}" type="datetime1">
               <a:rPr lang="en-US" smtClean="0"/>
               <a:pPr/>
-              <a:t>9/30/15</a:t>
+              <a:t>10/5/15</a:t>
             </a:fld>
             <a:endParaRPr lang="en-US"/>
           </a:p>
@@ -3414,7 +3414,7 @@
             <a:fld id="{F6CC4A83-AE34-48B8-B90E-70388FDBF0F7}" type="datetime1">
               <a:rPr lang="en-US" smtClean="0"/>
               <a:pPr/>
-              <a:t>9/30/15</a:t>
+              <a:t>10/5/15</a:t>
             </a:fld>
             <a:endParaRPr lang="en-US"/>
           </a:p>
@@ -3510,7 +3510,7 @@
             <a:fld id="{510CA3E2-9601-488E-B92B-23013819BD02}" type="datetime1">
               <a:rPr lang="en-US" smtClean="0"/>
               <a:pPr/>
-              <a:t>9/30/15</a:t>
+              <a:t>10/5/15</a:t>
             </a:fld>
             <a:endParaRPr lang="en-US"/>
           </a:p>
@@ -3788,7 +3788,7 @@
             <a:fld id="{331F1CBD-358A-4E18-86FD-C337233E15F0}" type="datetime1">
               <a:rPr lang="en-US" smtClean="0"/>
               <a:pPr/>
-              <a:t>9/30/15</a:t>
+              <a:t>10/5/15</a:t>
             </a:fld>
             <a:endParaRPr lang="en-US"/>
           </a:p>
@@ -4042,7 +4042,7 @@
             <a:fld id="{3CB4F0D5-901F-4458-A8F8-F062616694B4}" type="datetime1">
               <a:rPr lang="en-US" smtClean="0"/>
               <a:pPr/>
-              <a:t>9/30/15</a:t>
+              <a:t>10/5/15</a:t>
             </a:fld>
             <a:endParaRPr lang="en-US"/>
           </a:p>
@@ -4256,7 +4256,7 @@
             <a:fld id="{F77D84EF-BDBF-448B-906E-D51D4CAF22DC}" type="datetime1">
               <a:rPr lang="en-US" smtClean="0"/>
               <a:pPr/>
-              <a:t>9/30/15</a:t>
+              <a:t>10/5/15</a:t>
             </a:fld>
             <a:endParaRPr lang="en-US"/>
           </a:p>
@@ -4996,7 +4996,7 @@
           <a:graphicData uri="http://schemas.openxmlformats.org/presentationml/2006/ole">
             <mc:AlternateContent xmlns:mc="http://schemas.openxmlformats.org/markup-compatibility/2006">
               <mc:Choice xmlns:v="urn:schemas-microsoft-com:vml" Requires="v">
-                <p:oleObj spid="_x0000_s8205" name="Equation" r:id="rId4" imgW="3657600" imgH="1079500" progId="Equation.3">
+                <p:oleObj spid="_x0000_s8207" name="Equation" r:id="rId4" imgW="3657600" imgH="1079500" progId="Equation.3">
                   <p:embed/>
                 </p:oleObj>
               </mc:Choice>
@@ -5423,7 +5423,7 @@
           <a:graphicData uri="http://schemas.openxmlformats.org/presentationml/2006/ole">
             <mc:AlternateContent xmlns:mc="http://schemas.openxmlformats.org/markup-compatibility/2006">
               <mc:Choice xmlns:v="urn:schemas-microsoft-com:vml" Requires="v">
-                <p:oleObj spid="_x0000_s9237" name="Equation" r:id="rId4" imgW="2717800" imgH="584200" progId="Equation.3">
+                <p:oleObj spid="_x0000_s9240" name="Equation" r:id="rId4" imgW="2717800" imgH="584200" progId="Equation.3">
                   <p:embed/>
                 </p:oleObj>
               </mc:Choice>
@@ -5480,7 +5480,7 @@
           <a:graphicData uri="http://schemas.openxmlformats.org/presentationml/2006/ole">
             <mc:AlternateContent xmlns:mc="http://schemas.openxmlformats.org/markup-compatibility/2006">
               <mc:Choice xmlns:v="urn:schemas-microsoft-com:vml" Requires="v">
-                <p:oleObj spid="_x0000_s9238" name="Equation" r:id="rId6" imgW="4635500" imgH="508000" progId="Equation.3">
+                <p:oleObj spid="_x0000_s9241" name="Equation" r:id="rId6" imgW="4635500" imgH="508000" progId="Equation.3">
                   <p:embed/>
                 </p:oleObj>
               </mc:Choice>
@@ -6035,27 +6035,7 @@
                   </a:schemeClr>
                 </a:solidFill>
               </a:rPr>
-              <a:t>	- Sample </a:t>
-            </a:r>
-            <a:r>
-              <a:rPr lang="en-US" dirty="0" smtClean="0">
-                <a:solidFill>
-                  <a:schemeClr val="accent1">
-                    <a:lumMod val="75000"/>
-                  </a:schemeClr>
-                </a:solidFill>
-              </a:rPr>
-              <a:t>one </a:t>
-            </a:r>
-            <a:r>
-              <a:rPr lang="en-US" dirty="0" smtClean="0">
-                <a:solidFill>
-                  <a:schemeClr val="accent1">
-                    <a:lumMod val="75000"/>
-                  </a:schemeClr>
-                </a:solidFill>
-              </a:rPr>
-              <a:t>unknown from its marginal posterior distribution</a:t>
+              <a:t>	- Sample one unknown from its marginal posterior distribution</a:t>
             </a:r>
           </a:p>
           <a:p>
@@ -6125,7 +6105,7 @@
           <a:graphicData uri="http://schemas.openxmlformats.org/presentationml/2006/ole">
             <mc:AlternateContent xmlns:mc="http://schemas.openxmlformats.org/markup-compatibility/2006">
               <mc:Choice xmlns:v="urn:schemas-microsoft-com:vml" Requires="v">
-                <p:oleObj spid="_x0000_s10261" name="Equation" r:id="rId4" imgW="3263900" imgH="292100" progId="Equation.3">
+                <p:oleObj spid="_x0000_s10264" name="Equation" r:id="rId4" imgW="3263900" imgH="292100" progId="Equation.3">
                   <p:embed/>
                 </p:oleObj>
               </mc:Choice>
@@ -6182,7 +6162,7 @@
           <a:graphicData uri="http://schemas.openxmlformats.org/presentationml/2006/ole">
             <mc:AlternateContent xmlns:mc="http://schemas.openxmlformats.org/markup-compatibility/2006">
               <mc:Choice xmlns:v="urn:schemas-microsoft-com:vml" Requires="v">
-                <p:oleObj spid="_x0000_s10262" name="Equation" r:id="rId6" imgW="3187700" imgH="292100" progId="Equation.3">
+                <p:oleObj spid="_x0000_s10265" name="Equation" r:id="rId6" imgW="3187700" imgH="292100" progId="Equation.3">
                   <p:embed/>
                 </p:oleObj>
               </mc:Choice>
@@ -6644,7 +6624,7 @@
           <a:graphicData uri="http://schemas.openxmlformats.org/presentationml/2006/ole">
             <mc:AlternateContent xmlns:mc="http://schemas.openxmlformats.org/markup-compatibility/2006">
               <mc:Choice xmlns:v="urn:schemas-microsoft-com:vml" Requires="v">
-                <p:oleObj spid="_x0000_s11311" name="Equation" r:id="rId4" imgW="3263900" imgH="292100" progId="Equation.3">
+                <p:oleObj spid="_x0000_s11317" name="Equation" r:id="rId4" imgW="3263900" imgH="292100" progId="Equation.3">
                   <p:embed/>
                 </p:oleObj>
               </mc:Choice>
@@ -6701,7 +6681,7 @@
           <a:graphicData uri="http://schemas.openxmlformats.org/presentationml/2006/ole">
             <mc:AlternateContent xmlns:mc="http://schemas.openxmlformats.org/markup-compatibility/2006">
               <mc:Choice xmlns:v="urn:schemas-microsoft-com:vml" Requires="v">
-                <p:oleObj spid="_x0000_s11312" name="Equation" r:id="rId6" imgW="3238500" imgH="889000" progId="Equation.3">
+                <p:oleObj spid="_x0000_s11318" name="Equation" r:id="rId6" imgW="3238500" imgH="889000" progId="Equation.3">
                   <p:embed/>
                 </p:oleObj>
               </mc:Choice>
@@ -6758,7 +6738,7 @@
           <a:graphicData uri="http://schemas.openxmlformats.org/presentationml/2006/ole">
             <mc:AlternateContent xmlns:mc="http://schemas.openxmlformats.org/markup-compatibility/2006">
               <mc:Choice xmlns:v="urn:schemas-microsoft-com:vml" Requires="v">
-                <p:oleObj spid="_x0000_s11313" name="Equation" r:id="rId8" imgW="508000" imgH="228600" progId="Equation.3">
+                <p:oleObj spid="_x0000_s11319" name="Equation" r:id="rId8" imgW="508000" imgH="228600" progId="Equation.3">
                   <p:embed/>
                 </p:oleObj>
               </mc:Choice>
@@ -6815,7 +6795,7 @@
           <a:graphicData uri="http://schemas.openxmlformats.org/presentationml/2006/ole">
             <mc:AlternateContent xmlns:mc="http://schemas.openxmlformats.org/markup-compatibility/2006">
               <mc:Choice xmlns:v="urn:schemas-microsoft-com:vml" Requires="v">
-                <p:oleObj spid="_x0000_s11314" name="Equation" r:id="rId10" imgW="2501900" imgH="292100" progId="Equation.3">
+                <p:oleObj spid="_x0000_s11320" name="Equation" r:id="rId10" imgW="2501900" imgH="292100" progId="Equation.3">
                   <p:embed/>
                 </p:oleObj>
               </mc:Choice>
@@ -6872,7 +6852,7 @@
           <a:graphicData uri="http://schemas.openxmlformats.org/presentationml/2006/ole">
             <mc:AlternateContent xmlns:mc="http://schemas.openxmlformats.org/markup-compatibility/2006">
               <mc:Choice xmlns:v="urn:schemas-microsoft-com:vml" Requires="v">
-                <p:oleObj spid="_x0000_s11315" name="Equation" r:id="rId12" imgW="4584700" imgH="431800" progId="Equation.3">
+                <p:oleObj spid="_x0000_s11321" name="Equation" r:id="rId12" imgW="4584700" imgH="431800" progId="Equation.3">
                   <p:embed/>
                 </p:oleObj>
               </mc:Choice>
@@ -8356,7 +8336,20 @@
                   </a:schemeClr>
                 </a:solidFill>
               </a:rPr>
-              <a:t>	- </a:t>
+              <a:t>	- Take the log,</a:t>
+            </a:r>
+          </a:p>
+          <a:p>
+            <a:pPr algn="just"/>
+            <a:r>
+              <a:rPr lang="en-US" dirty="0">
+                <a:solidFill>
+                  <a:schemeClr val="accent1">
+                    <a:lumMod val="75000"/>
+                  </a:schemeClr>
+                </a:solidFill>
+              </a:rPr>
+              <a:t>	</a:t>
             </a:r>
             <a:r>
               <a:rPr lang="en-US" dirty="0" smtClean="0">
@@ -8366,55 +8359,8 @@
                   </a:schemeClr>
                 </a:solidFill>
               </a:rPr>
-              <a:t>Take the log,</a:t>
-            </a:r>
-            <a:endParaRPr lang="en-US" dirty="0" smtClean="0">
-              <a:solidFill>
-                <a:schemeClr val="accent1">
-                  <a:lumMod val="75000"/>
-                </a:schemeClr>
-              </a:solidFill>
-            </a:endParaRPr>
-          </a:p>
-          <a:p>
-            <a:pPr algn="just"/>
-            <a:r>
-              <a:rPr lang="en-US" dirty="0">
-                <a:solidFill>
-                  <a:schemeClr val="accent1">
-                    <a:lumMod val="75000"/>
-                  </a:schemeClr>
-                </a:solidFill>
-              </a:rPr>
-              <a:t>	</a:t>
-            </a:r>
-            <a:r>
-              <a:rPr lang="en-US" dirty="0" smtClean="0">
-                <a:solidFill>
-                  <a:schemeClr val="accent1">
-                    <a:lumMod val="75000"/>
-                  </a:schemeClr>
-                </a:solidFill>
-              </a:rPr>
-              <a:t>- Take derivatives with respect to each </a:t>
-            </a:r>
-            <a:r>
-              <a:rPr lang="en-US" dirty="0" smtClean="0">
-                <a:solidFill>
-                  <a:schemeClr val="accent1">
-                    <a:lumMod val="75000"/>
-                  </a:schemeClr>
-                </a:solidFill>
-              </a:rPr>
-              <a:t>parameter</a:t>
-            </a:r>
-            <a:endParaRPr lang="en-US" dirty="0" smtClean="0">
-              <a:solidFill>
-                <a:schemeClr val="accent1">
-                  <a:lumMod val="75000"/>
-                </a:schemeClr>
-              </a:solidFill>
-            </a:endParaRPr>
+              <a:t>- Take derivatives with respect to each parameter</a:t>
+            </a:r>
           </a:p>
           <a:p>
             <a:pPr algn="just"/>
@@ -8579,7 +8525,7 @@
           <a:graphicData uri="http://schemas.openxmlformats.org/presentationml/2006/ole">
             <mc:AlternateContent xmlns:mc="http://schemas.openxmlformats.org/markup-compatibility/2006">
               <mc:Choice xmlns:v="urn:schemas-microsoft-com:vml" Requires="v">
-                <p:oleObj spid="_x0000_s3108" name="Equation" r:id="rId4" imgW="2057400" imgH="457200" progId="Equation.3">
+                <p:oleObj spid="_x0000_s3111" name="Equation" r:id="rId4" imgW="2057400" imgH="457200" progId="Equation.3">
                   <p:embed/>
                 </p:oleObj>
               </mc:Choice>
@@ -8636,7 +8582,7 @@
           <a:graphicData uri="http://schemas.openxmlformats.org/presentationml/2006/ole">
             <mc:AlternateContent xmlns:mc="http://schemas.openxmlformats.org/markup-compatibility/2006">
               <mc:Choice xmlns:v="urn:schemas-microsoft-com:vml" Requires="v">
-                <p:oleObj spid="_x0000_s3109" name="Equation" r:id="rId6" imgW="4191000" imgH="457200" progId="Equation.3">
+                <p:oleObj spid="_x0000_s3112" name="Equation" r:id="rId6" imgW="4191000" imgH="457200" progId="Equation.3">
                   <p:embed/>
                 </p:oleObj>
               </mc:Choice>
@@ -8912,17 +8858,7 @@
                   </a:schemeClr>
                 </a:solidFill>
               </a:rPr>
-              <a:t>Discuss</a:t>
-            </a:r>
-            <a:r>
-              <a:rPr lang="en-US" dirty="0" smtClean="0">
-                <a:solidFill>
-                  <a:schemeClr val="accent1">
-                    <a:lumMod val="75000"/>
-                  </a:schemeClr>
-                </a:solidFill>
-              </a:rPr>
-              <a:t>: Bias and Variance of the MLE; approximate 95% CI.</a:t>
+              <a:t>Discuss: Bias and Variance of the MLE; approximate 95% CI.</a:t>
             </a:r>
             <a:endParaRPr lang="en-US" dirty="0">
               <a:solidFill>
@@ -8966,7 +8902,7 @@
           <a:graphicData uri="http://schemas.openxmlformats.org/presentationml/2006/ole">
             <mc:AlternateContent xmlns:mc="http://schemas.openxmlformats.org/markup-compatibility/2006">
               <mc:Choice xmlns:v="urn:schemas-microsoft-com:vml" Requires="v">
-                <p:oleObj spid="_x0000_s2064" name="Equation" r:id="rId4" imgW="2844800" imgH="495300" progId="Equation.3">
+                <p:oleObj spid="_x0000_s2066" name="Equation" r:id="rId4" imgW="2844800" imgH="495300" progId="Equation.3">
                   <p:embed/>
                 </p:oleObj>
               </mc:Choice>
@@ -9369,7 +9305,7 @@
           <a:graphicData uri="http://schemas.openxmlformats.org/presentationml/2006/ole">
             <mc:AlternateContent xmlns:mc="http://schemas.openxmlformats.org/markup-compatibility/2006">
               <mc:Choice xmlns:v="urn:schemas-microsoft-com:vml" Requires="v">
-                <p:oleObj spid="_x0000_s1070" name="Equation" r:id="rId4" imgW="2654300" imgH="381000" progId="Equation.3">
+                <p:oleObj spid="_x0000_s1074" name="Equation" r:id="rId4" imgW="2654300" imgH="381000" progId="Equation.3">
                   <p:embed/>
                 </p:oleObj>
               </mc:Choice>
@@ -9426,7 +9362,7 @@
           <a:graphicData uri="http://schemas.openxmlformats.org/presentationml/2006/ole">
             <mc:AlternateContent xmlns:mc="http://schemas.openxmlformats.org/markup-compatibility/2006">
               <mc:Choice xmlns:v="urn:schemas-microsoft-com:vml" Requires="v">
-                <p:oleObj spid="_x0000_s1071" name="Equation" r:id="rId6" imgW="2286000" imgH="406400" progId="Equation.3">
+                <p:oleObj spid="_x0000_s1075" name="Equation" r:id="rId6" imgW="2286000" imgH="406400" progId="Equation.3">
                   <p:embed/>
                 </p:oleObj>
               </mc:Choice>
@@ -9483,7 +9419,7 @@
           <a:graphicData uri="http://schemas.openxmlformats.org/presentationml/2006/ole">
             <mc:AlternateContent xmlns:mc="http://schemas.openxmlformats.org/markup-compatibility/2006">
               <mc:Choice xmlns:v="urn:schemas-microsoft-com:vml" Requires="v">
-                <p:oleObj spid="_x0000_s1072" name="Equation" r:id="rId8" imgW="4089400" imgH="1041400" progId="Equation.3">
+                <p:oleObj spid="_x0000_s1076" name="Equation" r:id="rId8" imgW="4089400" imgH="1041400" progId="Equation.3">
                   <p:embed/>
                 </p:oleObj>
               </mc:Choice>
@@ -9912,7 +9848,7 @@
           <a:graphicData uri="http://schemas.openxmlformats.org/presentationml/2006/ole">
             <mc:AlternateContent xmlns:mc="http://schemas.openxmlformats.org/markup-compatibility/2006">
               <mc:Choice xmlns:v="urn:schemas-microsoft-com:vml" Requires="v">
-                <p:oleObj spid="_x0000_s4148" name="Equation" r:id="rId4" imgW="5791200" imgH="2489200" progId="Equation.3">
+                <p:oleObj spid="_x0000_s4153" name="Equation" r:id="rId4" imgW="5791200" imgH="2489200" progId="Equation.3">
                   <p:embed/>
                 </p:oleObj>
               </mc:Choice>
@@ -9969,7 +9905,7 @@
           <a:graphicData uri="http://schemas.openxmlformats.org/presentationml/2006/ole">
             <mc:AlternateContent xmlns:mc="http://schemas.openxmlformats.org/markup-compatibility/2006">
               <mc:Choice xmlns:v="urn:schemas-microsoft-com:vml" Requires="v">
-                <p:oleObj spid="_x0000_s4149" name="Equation" r:id="rId6" imgW="584200" imgH="342900" progId="Equation.3">
+                <p:oleObj spid="_x0000_s4154" name="Equation" r:id="rId6" imgW="584200" imgH="342900" progId="Equation.3">
                   <p:embed/>
                 </p:oleObj>
               </mc:Choice>
@@ -10013,25 +9949,25 @@
           <p:nvPr>
             <p:extLst>
               <p:ext uri="{D42A27DB-BD31-4B8C-83A1-F6EECF244321}">
-                <p14:modId xmlns:p14="http://schemas.microsoft.com/office/powerpoint/2010/main" val="735802587"/>
+                <p14:modId xmlns:p14="http://schemas.microsoft.com/office/powerpoint/2010/main" val="3979593831"/>
               </p:ext>
             </p:extLst>
           </p:nvPr>
         </p:nvGraphicFramePr>
         <p:xfrm>
-          <a:off x="1905000" y="4876800"/>
-          <a:ext cx="1089025" cy="522288"/>
+          <a:off x="1958975" y="4822825"/>
+          <a:ext cx="1089025" cy="587375"/>
         </p:xfrm>
         <a:graphic>
           <a:graphicData uri="http://schemas.openxmlformats.org/presentationml/2006/ole">
             <mc:AlternateContent xmlns:mc="http://schemas.openxmlformats.org/markup-compatibility/2006">
               <mc:Choice xmlns:v="urn:schemas-microsoft-com:vml" Requires="v">
-                <p:oleObj spid="_x0000_s4150" name="Equation" r:id="rId8" imgW="635000" imgH="304800" progId="Equation.3">
+                <p:oleObj spid="_x0000_s4155" name="Equation" r:id="rId8" imgW="635000" imgH="342900" progId="Equation.3">
                   <p:embed/>
                 </p:oleObj>
               </mc:Choice>
               <mc:Fallback>
-                <p:oleObj name="Equation" r:id="rId8" imgW="635000" imgH="304800" progId="Equation.3">
+                <p:oleObj name="Equation" r:id="rId8" imgW="635000" imgH="342900" progId="Equation.3">
                   <p:embed/>
                   <p:pic>
                     <p:nvPicPr>
@@ -10047,8 +9983,8 @@
                     </p:blipFill>
                     <p:spPr>
                       <a:xfrm>
-                        <a:off x="1905000" y="4876800"/>
-                        <a:ext cx="1089025" cy="522288"/>
+                        <a:off x="1958975" y="4822825"/>
+                        <a:ext cx="1089025" cy="587375"/>
                       </a:xfrm>
                       <a:prstGeom prst="rect">
                         <a:avLst/>
@@ -10083,7 +10019,7 @@
           <a:graphicData uri="http://schemas.openxmlformats.org/presentationml/2006/ole">
             <mc:AlternateContent xmlns:mc="http://schemas.openxmlformats.org/markup-compatibility/2006">
               <mc:Choice xmlns:v="urn:schemas-microsoft-com:vml" Requires="v">
-                <p:oleObj spid="_x0000_s4151" name="Equation" r:id="rId10" imgW="3263900" imgH="406400" progId="Equation.3">
+                <p:oleObj spid="_x0000_s4156" name="Equation" r:id="rId10" imgW="3263900" imgH="406400" progId="Equation.3">
                   <p:embed/>
                 </p:oleObj>
               </mc:Choice>
@@ -10469,7 +10405,7 @@
           <a:graphicData uri="http://schemas.openxmlformats.org/presentationml/2006/ole">
             <mc:AlternateContent xmlns:mc="http://schemas.openxmlformats.org/markup-compatibility/2006">
               <mc:Choice xmlns:v="urn:schemas-microsoft-com:vml" Requires="v">
-                <p:oleObj spid="_x0000_s5137" name="Equation" r:id="rId4" imgW="3644900" imgH="2260600" progId="Equation.3">
+                <p:oleObj spid="_x0000_s5139" name="Equation" r:id="rId4" imgW="3644900" imgH="2260600" progId="Equation.3">
                   <p:embed/>
                 </p:oleObj>
               </mc:Choice>
@@ -10804,25 +10740,8 @@
                   </a:schemeClr>
                 </a:solidFill>
               </a:rPr>
-              <a:t>  =&gt; In this case the MLE is </a:t>
-            </a:r>
-            <a:r>
-              <a:rPr lang="en-US" dirty="0" smtClean="0">
-                <a:solidFill>
-                  <a:schemeClr val="accent1">
-                    <a:lumMod val="75000"/>
-                  </a:schemeClr>
-                </a:solidFill>
-              </a:rPr>
-              <a:t>unbiased</a:t>
-            </a:r>
-            <a:endParaRPr lang="en-US" dirty="0" smtClean="0">
-              <a:solidFill>
-                <a:schemeClr val="accent1">
-                  <a:lumMod val="75000"/>
-                </a:schemeClr>
-              </a:solidFill>
-            </a:endParaRPr>
+              <a:t>  =&gt; In this case the MLE is unbiased</a:t>
+            </a:r>
           </a:p>
           <a:p>
             <a:pPr algn="just"/>
@@ -11043,7 +10962,7 @@
           <a:graphicData uri="http://schemas.openxmlformats.org/presentationml/2006/ole">
             <mc:AlternateContent xmlns:mc="http://schemas.openxmlformats.org/markup-compatibility/2006">
               <mc:Choice xmlns:v="urn:schemas-microsoft-com:vml" Requires="v">
-                <p:oleObj spid="_x0000_s6168" name="Equation" r:id="rId4" imgW="571500" imgH="203200" progId="Equation.3">
+                <p:oleObj spid="_x0000_s6171" name="Equation" r:id="rId4" imgW="571500" imgH="203200" progId="Equation.3">
                   <p:embed/>
                 </p:oleObj>
               </mc:Choice>
@@ -11087,25 +11006,25 @@
           <p:nvPr>
             <p:extLst>
               <p:ext uri="{D42A27DB-BD31-4B8C-83A1-F6EECF244321}">
-                <p14:modId xmlns:p14="http://schemas.microsoft.com/office/powerpoint/2010/main" val="628543108"/>
+                <p14:modId xmlns:p14="http://schemas.microsoft.com/office/powerpoint/2010/main" val="3270084679"/>
               </p:ext>
             </p:extLst>
           </p:nvPr>
         </p:nvGraphicFramePr>
         <p:xfrm>
-          <a:off x="4419600" y="958850"/>
-          <a:ext cx="2105026" cy="1403350"/>
+          <a:off x="4419600" y="915988"/>
+          <a:ext cx="2105025" cy="1490662"/>
         </p:xfrm>
         <a:graphic>
           <a:graphicData uri="http://schemas.openxmlformats.org/presentationml/2006/ole">
             <mc:AlternateContent xmlns:mc="http://schemas.openxmlformats.org/markup-compatibility/2006">
               <mc:Choice xmlns:v="urn:schemas-microsoft-com:vml" Requires="v">
-                <p:oleObj spid="_x0000_s6169" name="Equation" r:id="rId6" imgW="914400" imgH="609600" progId="Equation.3">
+                <p:oleObj spid="_x0000_s6172" name="Equation" r:id="rId6" imgW="914400" imgH="647700" progId="Equation.3">
                   <p:embed/>
                 </p:oleObj>
               </mc:Choice>
               <mc:Fallback>
-                <p:oleObj name="Equation" r:id="rId6" imgW="914400" imgH="609600" progId="Equation.3">
+                <p:oleObj name="Equation" r:id="rId6" imgW="914400" imgH="647700" progId="Equation.3">
                   <p:embed/>
                   <p:pic>
                     <p:nvPicPr>
@@ -11121,8 +11040,8 @@
                     </p:blipFill>
                     <p:spPr>
                       <a:xfrm>
-                        <a:off x="4419600" y="958850"/>
-                        <a:ext cx="2105026" cy="1403350"/>
+                        <a:off x="4419600" y="915988"/>
+                        <a:ext cx="2105025" cy="1490662"/>
                       </a:xfrm>
                       <a:prstGeom prst="rect">
                         <a:avLst/>
@@ -11374,17 +11293,7 @@
                   </a:schemeClr>
                 </a:solidFill>
               </a:rPr>
-              <a:t> </a:t>
-            </a:r>
-            <a:r>
-              <a:rPr lang="en-US" dirty="0" smtClean="0">
-                <a:solidFill>
-                  <a:schemeClr val="accent1">
-                    <a:lumMod val="75000"/>
-                  </a:schemeClr>
-                </a:solidFill>
-              </a:rPr>
-              <a:t>Likelihood (viewed as a function of the variance, for fixed mean)</a:t>
+              <a:t> Likelihood (viewed as a function of the variance, for fixed mean)</a:t>
             </a:r>
           </a:p>
           <a:p>
@@ -11551,7 +11460,7 @@
           <a:graphicData uri="http://schemas.openxmlformats.org/presentationml/2006/ole">
             <mc:AlternateContent xmlns:mc="http://schemas.openxmlformats.org/markup-compatibility/2006">
               <mc:Choice xmlns:v="urn:schemas-microsoft-com:vml" Requires="v">
-                <p:oleObj spid="_x0000_s7191" name="Equation" r:id="rId4" imgW="2667000" imgH="787400" progId="Equation.3">
+                <p:oleObj spid="_x0000_s7194" name="Equation" r:id="rId4" imgW="2667000" imgH="787400" progId="Equation.3">
                   <p:embed/>
                 </p:oleObj>
               </mc:Choice>
@@ -11608,7 +11517,7 @@
           <a:graphicData uri="http://schemas.openxmlformats.org/presentationml/2006/ole">
             <mc:AlternateContent xmlns:mc="http://schemas.openxmlformats.org/markup-compatibility/2006">
               <mc:Choice xmlns:v="urn:schemas-microsoft-com:vml" Requires="v">
-                <p:oleObj spid="_x0000_s7192" name="Equation" r:id="rId6" imgW="4483100" imgH="546100" progId="Equation.3">
+                <p:oleObj spid="_x0000_s7195" name="Equation" r:id="rId6" imgW="4483100" imgH="546100" progId="Equation.3">
                   <p:embed/>
                 </p:oleObj>
               </mc:Choice>

</xml_diff>